<commit_message>
Still in progress — added section about assertions
</commit_message>
<xml_diff>
--- a/DefensiveProgrammingTechniques.pptx
+++ b/DefensiveProgrammingTechniques.pptx
@@ -4,15 +4,29 @@
   <p:sldMasterIdLst>
     <p:sldMasterId id="2147483648" r:id="rId1"/>
   </p:sldMasterIdLst>
+  <p:notesMasterIdLst>
+    <p:notesMasterId r:id="rId21"/>
+  </p:notesMasterIdLst>
   <p:sldIdLst>
     <p:sldId id="256" r:id="rId2"/>
     <p:sldId id="257" r:id="rId3"/>
-    <p:sldId id="258" r:id="rId4"/>
-    <p:sldId id="259" r:id="rId5"/>
-    <p:sldId id="260" r:id="rId6"/>
-    <p:sldId id="261" r:id="rId7"/>
-    <p:sldId id="262" r:id="rId8"/>
-    <p:sldId id="263" r:id="rId9"/>
+    <p:sldId id="266" r:id="rId4"/>
+    <p:sldId id="265" r:id="rId5"/>
+    <p:sldId id="259" r:id="rId6"/>
+    <p:sldId id="267" r:id="rId7"/>
+    <p:sldId id="268" r:id="rId8"/>
+    <p:sldId id="260" r:id="rId9"/>
+    <p:sldId id="269" r:id="rId10"/>
+    <p:sldId id="270" r:id="rId11"/>
+    <p:sldId id="271" r:id="rId12"/>
+    <p:sldId id="272" r:id="rId13"/>
+    <p:sldId id="273" r:id="rId14"/>
+    <p:sldId id="274" r:id="rId15"/>
+    <p:sldId id="264" r:id="rId16"/>
+    <p:sldId id="261" r:id="rId17"/>
+    <p:sldId id="258" r:id="rId18"/>
+    <p:sldId id="262" r:id="rId19"/>
+    <p:sldId id="263" r:id="rId20"/>
   </p:sldIdLst>
   <p:sldSz cx="9144000" cy="6858000" type="screen4x3"/>
   <p:notesSz cx="6858000" cy="9144000"/>
@@ -114,6 +128,454 @@
 </p:presentation>
 </file>
 
+<file path=ppt/notesMasters/notesMaster1.xml><?xml version="1.0" encoding="utf-8"?>
+<p:notesMaster xmlns:a="http://schemas.openxmlformats.org/drawingml/2006/main" xmlns:r="http://schemas.openxmlformats.org/officeDocument/2006/relationships" xmlns:p="http://schemas.openxmlformats.org/presentationml/2006/main">
+  <p:cSld>
+    <p:bg>
+      <p:bgRef idx="1001">
+        <a:schemeClr val="bg1"/>
+      </p:bgRef>
+    </p:bg>
+    <p:spTree>
+      <p:nvGrpSpPr>
+        <p:cNvPr id="1" name=""/>
+        <p:cNvGrpSpPr/>
+        <p:nvPr/>
+      </p:nvGrpSpPr>
+      <p:grpSpPr>
+        <a:xfrm>
+          <a:off x="0" y="0"/>
+          <a:ext cx="0" cy="0"/>
+          <a:chOff x="0" y="0"/>
+          <a:chExt cx="0" cy="0"/>
+        </a:xfrm>
+      </p:grpSpPr>
+      <p:sp>
+        <p:nvSpPr>
+          <p:cNvPr id="2" name="Header Placeholder 1"/>
+          <p:cNvSpPr>
+            <a:spLocks noGrp="1"/>
+          </p:cNvSpPr>
+          <p:nvPr>
+            <p:ph type="hdr" sz="quarter"/>
+          </p:nvPr>
+        </p:nvSpPr>
+        <p:spPr>
+          <a:xfrm>
+            <a:off x="0" y="0"/>
+            <a:ext cx="2971800" cy="457200"/>
+          </a:xfrm>
+          <a:prstGeom prst="rect">
+            <a:avLst/>
+          </a:prstGeom>
+        </p:spPr>
+        <p:txBody>
+          <a:bodyPr vert="horz" lIns="91440" tIns="45720" rIns="91440" bIns="45720" rtlCol="0"/>
+          <a:lstStyle>
+            <a:lvl1pPr algn="l">
+              <a:defRPr sz="1200"/>
+            </a:lvl1pPr>
+          </a:lstStyle>
+          <a:p>
+            <a:endParaRPr lang="en-US"/>
+          </a:p>
+        </p:txBody>
+      </p:sp>
+      <p:sp>
+        <p:nvSpPr>
+          <p:cNvPr id="3" name="Date Placeholder 2"/>
+          <p:cNvSpPr>
+            <a:spLocks noGrp="1"/>
+          </p:cNvSpPr>
+          <p:nvPr>
+            <p:ph type="dt" idx="1"/>
+          </p:nvPr>
+        </p:nvSpPr>
+        <p:spPr>
+          <a:xfrm>
+            <a:off x="3884613" y="0"/>
+            <a:ext cx="2971800" cy="457200"/>
+          </a:xfrm>
+          <a:prstGeom prst="rect">
+            <a:avLst/>
+          </a:prstGeom>
+        </p:spPr>
+        <p:txBody>
+          <a:bodyPr vert="horz" lIns="91440" tIns="45720" rIns="91440" bIns="45720" rtlCol="0"/>
+          <a:lstStyle>
+            <a:lvl1pPr algn="r">
+              <a:defRPr sz="1200"/>
+            </a:lvl1pPr>
+          </a:lstStyle>
+          <a:p>
+            <a:fld id="{A4014C45-DC3F-D943-BCF3-94BAE68E15F7}" type="datetimeFigureOut">
+              <a:rPr lang="en-US" smtClean="0"/>
+              <a:t>11/29/13</a:t>
+            </a:fld>
+            <a:endParaRPr lang="en-US"/>
+          </a:p>
+        </p:txBody>
+      </p:sp>
+      <p:sp>
+        <p:nvSpPr>
+          <p:cNvPr id="4" name="Slide Image Placeholder 3"/>
+          <p:cNvSpPr>
+            <a:spLocks noGrp="1" noRot="1" noChangeAspect="1"/>
+          </p:cNvSpPr>
+          <p:nvPr>
+            <p:ph type="sldImg" idx="2"/>
+          </p:nvPr>
+        </p:nvSpPr>
+        <p:spPr>
+          <a:xfrm>
+            <a:off x="1143000" y="685800"/>
+            <a:ext cx="4572000" cy="3429000"/>
+          </a:xfrm>
+          <a:prstGeom prst="rect">
+            <a:avLst/>
+          </a:prstGeom>
+          <a:noFill/>
+          <a:ln w="12700">
+            <a:solidFill>
+              <a:prstClr val="black"/>
+            </a:solidFill>
+          </a:ln>
+        </p:spPr>
+        <p:txBody>
+          <a:bodyPr vert="horz" lIns="91440" tIns="45720" rIns="91440" bIns="45720" rtlCol="0" anchor="ctr"/>
+          <a:lstStyle/>
+          <a:p>
+            <a:endParaRPr lang="en-US"/>
+          </a:p>
+        </p:txBody>
+      </p:sp>
+      <p:sp>
+        <p:nvSpPr>
+          <p:cNvPr id="5" name="Notes Placeholder 4"/>
+          <p:cNvSpPr>
+            <a:spLocks noGrp="1"/>
+          </p:cNvSpPr>
+          <p:nvPr>
+            <p:ph type="body" sz="quarter" idx="3"/>
+          </p:nvPr>
+        </p:nvSpPr>
+        <p:spPr>
+          <a:xfrm>
+            <a:off x="685800" y="4343400"/>
+            <a:ext cx="5486400" cy="4114800"/>
+          </a:xfrm>
+          <a:prstGeom prst="rect">
+            <a:avLst/>
+          </a:prstGeom>
+        </p:spPr>
+        <p:txBody>
+          <a:bodyPr vert="horz" lIns="91440" tIns="45720" rIns="91440" bIns="45720" rtlCol="0"/>
+          <a:lstStyle/>
+          <a:p>
+            <a:pPr lvl="0"/>
+            <a:r>
+              <a:rPr lang="en-US" smtClean="0"/>
+              <a:t>Click to edit Master text styles</a:t>
+            </a:r>
+          </a:p>
+          <a:p>
+            <a:pPr lvl="1"/>
+            <a:r>
+              <a:rPr lang="en-US" smtClean="0"/>
+              <a:t>Second level</a:t>
+            </a:r>
+          </a:p>
+          <a:p>
+            <a:pPr lvl="2"/>
+            <a:r>
+              <a:rPr lang="en-US" smtClean="0"/>
+              <a:t>Third level</a:t>
+            </a:r>
+          </a:p>
+          <a:p>
+            <a:pPr lvl="3"/>
+            <a:r>
+              <a:rPr lang="en-US" smtClean="0"/>
+              <a:t>Fourth level</a:t>
+            </a:r>
+          </a:p>
+          <a:p>
+            <a:pPr lvl="4"/>
+            <a:r>
+              <a:rPr lang="en-US" smtClean="0"/>
+              <a:t>Fifth level</a:t>
+            </a:r>
+            <a:endParaRPr lang="en-US"/>
+          </a:p>
+        </p:txBody>
+      </p:sp>
+      <p:sp>
+        <p:nvSpPr>
+          <p:cNvPr id="6" name="Footer Placeholder 5"/>
+          <p:cNvSpPr>
+            <a:spLocks noGrp="1"/>
+          </p:cNvSpPr>
+          <p:nvPr>
+            <p:ph type="ftr" sz="quarter" idx="4"/>
+          </p:nvPr>
+        </p:nvSpPr>
+        <p:spPr>
+          <a:xfrm>
+            <a:off x="0" y="8685213"/>
+            <a:ext cx="2971800" cy="457200"/>
+          </a:xfrm>
+          <a:prstGeom prst="rect">
+            <a:avLst/>
+          </a:prstGeom>
+        </p:spPr>
+        <p:txBody>
+          <a:bodyPr vert="horz" lIns="91440" tIns="45720" rIns="91440" bIns="45720" rtlCol="0" anchor="b"/>
+          <a:lstStyle>
+            <a:lvl1pPr algn="l">
+              <a:defRPr sz="1200"/>
+            </a:lvl1pPr>
+          </a:lstStyle>
+          <a:p>
+            <a:endParaRPr lang="en-US"/>
+          </a:p>
+        </p:txBody>
+      </p:sp>
+      <p:sp>
+        <p:nvSpPr>
+          <p:cNvPr id="7" name="Slide Number Placeholder 6"/>
+          <p:cNvSpPr>
+            <a:spLocks noGrp="1"/>
+          </p:cNvSpPr>
+          <p:nvPr>
+            <p:ph type="sldNum" sz="quarter" idx="5"/>
+          </p:nvPr>
+        </p:nvSpPr>
+        <p:spPr>
+          <a:xfrm>
+            <a:off x="3884613" y="8685213"/>
+            <a:ext cx="2971800" cy="457200"/>
+          </a:xfrm>
+          <a:prstGeom prst="rect">
+            <a:avLst/>
+          </a:prstGeom>
+        </p:spPr>
+        <p:txBody>
+          <a:bodyPr vert="horz" lIns="91440" tIns="45720" rIns="91440" bIns="45720" rtlCol="0" anchor="b"/>
+          <a:lstStyle>
+            <a:lvl1pPr algn="r">
+              <a:defRPr sz="1200"/>
+            </a:lvl1pPr>
+          </a:lstStyle>
+          <a:p>
+            <a:fld id="{144C6EB3-8854-0A42-AA3E-F8B698C04072}" type="slidenum">
+              <a:rPr lang="en-US" smtClean="0"/>
+              <a:t>‹#›</a:t>
+            </a:fld>
+            <a:endParaRPr lang="en-US"/>
+          </a:p>
+        </p:txBody>
+      </p:sp>
+    </p:spTree>
+    <p:extLst>
+      <p:ext uri="{BB962C8B-B14F-4D97-AF65-F5344CB8AC3E}">
+        <p14:creationId xmlns:p14="http://schemas.microsoft.com/office/powerpoint/2010/main" val="831610691"/>
+      </p:ext>
+    </p:extLst>
+  </p:cSld>
+  <p:clrMap bg1="lt1" tx1="dk1" bg2="lt2" tx2="dk2" accent1="accent1" accent2="accent2" accent3="accent3" accent4="accent4" accent5="accent5" accent6="accent6" hlink="hlink" folHlink="folHlink"/>
+  <p:notesStyle>
+    <a:lvl1pPr marL="0" algn="l" defTabSz="457200" rtl="0" eaLnBrk="1" latinLnBrk="0" hangingPunct="1">
+      <a:defRPr sz="1200" kern="1200">
+        <a:solidFill>
+          <a:schemeClr val="tx1"/>
+        </a:solidFill>
+        <a:latin typeface="+mn-lt"/>
+        <a:ea typeface="+mn-ea"/>
+        <a:cs typeface="+mn-cs"/>
+      </a:defRPr>
+    </a:lvl1pPr>
+    <a:lvl2pPr marL="457200" algn="l" defTabSz="457200" rtl="0" eaLnBrk="1" latinLnBrk="0" hangingPunct="1">
+      <a:defRPr sz="1200" kern="1200">
+        <a:solidFill>
+          <a:schemeClr val="tx1"/>
+        </a:solidFill>
+        <a:latin typeface="+mn-lt"/>
+        <a:ea typeface="+mn-ea"/>
+        <a:cs typeface="+mn-cs"/>
+      </a:defRPr>
+    </a:lvl2pPr>
+    <a:lvl3pPr marL="914400" algn="l" defTabSz="457200" rtl="0" eaLnBrk="1" latinLnBrk="0" hangingPunct="1">
+      <a:defRPr sz="1200" kern="1200">
+        <a:solidFill>
+          <a:schemeClr val="tx1"/>
+        </a:solidFill>
+        <a:latin typeface="+mn-lt"/>
+        <a:ea typeface="+mn-ea"/>
+        <a:cs typeface="+mn-cs"/>
+      </a:defRPr>
+    </a:lvl3pPr>
+    <a:lvl4pPr marL="1371600" algn="l" defTabSz="457200" rtl="0" eaLnBrk="1" latinLnBrk="0" hangingPunct="1">
+      <a:defRPr sz="1200" kern="1200">
+        <a:solidFill>
+          <a:schemeClr val="tx1"/>
+        </a:solidFill>
+        <a:latin typeface="+mn-lt"/>
+        <a:ea typeface="+mn-ea"/>
+        <a:cs typeface="+mn-cs"/>
+      </a:defRPr>
+    </a:lvl4pPr>
+    <a:lvl5pPr marL="1828800" algn="l" defTabSz="457200" rtl="0" eaLnBrk="1" latinLnBrk="0" hangingPunct="1">
+      <a:defRPr sz="1200" kern="1200">
+        <a:solidFill>
+          <a:schemeClr val="tx1"/>
+        </a:solidFill>
+        <a:latin typeface="+mn-lt"/>
+        <a:ea typeface="+mn-ea"/>
+        <a:cs typeface="+mn-cs"/>
+      </a:defRPr>
+    </a:lvl5pPr>
+    <a:lvl6pPr marL="2286000" algn="l" defTabSz="457200" rtl="0" eaLnBrk="1" latinLnBrk="0" hangingPunct="1">
+      <a:defRPr sz="1200" kern="1200">
+        <a:solidFill>
+          <a:schemeClr val="tx1"/>
+        </a:solidFill>
+        <a:latin typeface="+mn-lt"/>
+        <a:ea typeface="+mn-ea"/>
+        <a:cs typeface="+mn-cs"/>
+      </a:defRPr>
+    </a:lvl6pPr>
+    <a:lvl7pPr marL="2743200" algn="l" defTabSz="457200" rtl="0" eaLnBrk="1" latinLnBrk="0" hangingPunct="1">
+      <a:defRPr sz="1200" kern="1200">
+        <a:solidFill>
+          <a:schemeClr val="tx1"/>
+        </a:solidFill>
+        <a:latin typeface="+mn-lt"/>
+        <a:ea typeface="+mn-ea"/>
+        <a:cs typeface="+mn-cs"/>
+      </a:defRPr>
+    </a:lvl7pPr>
+    <a:lvl8pPr marL="3200400" algn="l" defTabSz="457200" rtl="0" eaLnBrk="1" latinLnBrk="0" hangingPunct="1">
+      <a:defRPr sz="1200" kern="1200">
+        <a:solidFill>
+          <a:schemeClr val="tx1"/>
+        </a:solidFill>
+        <a:latin typeface="+mn-lt"/>
+        <a:ea typeface="+mn-ea"/>
+        <a:cs typeface="+mn-cs"/>
+      </a:defRPr>
+    </a:lvl8pPr>
+    <a:lvl9pPr marL="3657600" algn="l" defTabSz="457200" rtl="0" eaLnBrk="1" latinLnBrk="0" hangingPunct="1">
+      <a:defRPr sz="1200" kern="1200">
+        <a:solidFill>
+          <a:schemeClr val="tx1"/>
+        </a:solidFill>
+        <a:latin typeface="+mn-lt"/>
+        <a:ea typeface="+mn-ea"/>
+        <a:cs typeface="+mn-cs"/>
+      </a:defRPr>
+    </a:lvl9pPr>
+  </p:notesStyle>
+</p:notesMaster>
+</file>
+
+<file path=ppt/notesSlides/notesSlide1.xml><?xml version="1.0" encoding="utf-8"?>
+<p:notes xmlns:a="http://schemas.openxmlformats.org/drawingml/2006/main" xmlns:r="http://schemas.openxmlformats.org/officeDocument/2006/relationships" xmlns:p="http://schemas.openxmlformats.org/presentationml/2006/main">
+  <p:cSld>
+    <p:spTree>
+      <p:nvGrpSpPr>
+        <p:cNvPr id="1" name=""/>
+        <p:cNvGrpSpPr/>
+        <p:nvPr/>
+      </p:nvGrpSpPr>
+      <p:grpSpPr>
+        <a:xfrm>
+          <a:off x="0" y="0"/>
+          <a:ext cx="0" cy="0"/>
+          <a:chOff x="0" y="0"/>
+          <a:chExt cx="0" cy="0"/>
+        </a:xfrm>
+      </p:grpSpPr>
+      <p:sp>
+        <p:nvSpPr>
+          <p:cNvPr id="2" name="Slide Image Placeholder 1"/>
+          <p:cNvSpPr>
+            <a:spLocks noGrp="1" noRot="1" noChangeAspect="1"/>
+          </p:cNvSpPr>
+          <p:nvPr>
+            <p:ph type="sldImg"/>
+          </p:nvPr>
+        </p:nvSpPr>
+        <p:spPr/>
+      </p:sp>
+      <p:sp>
+        <p:nvSpPr>
+          <p:cNvPr id="3" name="Notes Placeholder 2"/>
+          <p:cNvSpPr>
+            <a:spLocks noGrp="1"/>
+          </p:cNvSpPr>
+          <p:nvPr>
+            <p:ph type="body" idx="1"/>
+          </p:nvPr>
+        </p:nvSpPr>
+        <p:spPr/>
+        <p:txBody>
+          <a:bodyPr/>
+          <a:lstStyle/>
+          <a:p>
+            <a:r>
+              <a:rPr lang="en-US" i="1" dirty="0" smtClean="0"/>
+              <a:t>Bad - Dereference the pointer foo to get at a member function called Print and call it </a:t>
+            </a:r>
+          </a:p>
+          <a:p>
+            <a:r>
+              <a:rPr lang="en-US" i="1" dirty="0" smtClean="0"/>
+              <a:t>Good</a:t>
+            </a:r>
+            <a:r>
+              <a:rPr lang="en-US" i="1" baseline="0" dirty="0" smtClean="0"/>
+              <a:t> – Tell foo to print itself ---- that is the INTENT</a:t>
+            </a:r>
+            <a:endParaRPr lang="en-US" dirty="0"/>
+          </a:p>
+        </p:txBody>
+      </p:sp>
+      <p:sp>
+        <p:nvSpPr>
+          <p:cNvPr id="4" name="Slide Number Placeholder 3"/>
+          <p:cNvSpPr>
+            <a:spLocks noGrp="1"/>
+          </p:cNvSpPr>
+          <p:nvPr>
+            <p:ph type="sldNum" sz="quarter" idx="10"/>
+          </p:nvPr>
+        </p:nvSpPr>
+        <p:spPr/>
+        <p:txBody>
+          <a:bodyPr/>
+          <a:lstStyle/>
+          <a:p>
+            <a:fld id="{144C6EB3-8854-0A42-AA3E-F8B698C04072}" type="slidenum">
+              <a:rPr lang="en-US" smtClean="0"/>
+              <a:t>3</a:t>
+            </a:fld>
+            <a:endParaRPr lang="en-US"/>
+          </a:p>
+        </p:txBody>
+      </p:sp>
+    </p:spTree>
+    <p:extLst>
+      <p:ext uri="{BB962C8B-B14F-4D97-AF65-F5344CB8AC3E}">
+        <p14:creationId xmlns:p14="http://schemas.microsoft.com/office/powerpoint/2010/main" val="2942294242"/>
+      </p:ext>
+    </p:extLst>
+  </p:cSld>
+  <p:clrMapOvr>
+    <a:masterClrMapping/>
+  </p:clrMapOvr>
+</p:notes>
+</file>
+
 <file path=ppt/slideLayouts/slideLayout1.xml><?xml version="1.0" encoding="utf-8"?>
 <p:sldLayout xmlns:a="http://schemas.openxmlformats.org/drawingml/2006/main" xmlns:r="http://schemas.openxmlformats.org/officeDocument/2006/relationships" xmlns:p="http://schemas.openxmlformats.org/presentationml/2006/main" type="title" preserve="1">
   <p:cSld name="Title Slide">
@@ -295,7 +757,7 @@
           <a:p>
             <a:fld id="{68FEF4AB-F77E-2144-8AAF-8D88F8FB88C9}" type="datetimeFigureOut">
               <a:rPr lang="en-US" smtClean="0"/>
-              <a:t>11/26/13</a:t>
+              <a:t>11/29/13</a:t>
             </a:fld>
             <a:endParaRPr lang="en-US"/>
           </a:p>
@@ -465,7 +927,7 @@
           <a:p>
             <a:fld id="{68FEF4AB-F77E-2144-8AAF-8D88F8FB88C9}" type="datetimeFigureOut">
               <a:rPr lang="en-US" smtClean="0"/>
-              <a:t>11/26/13</a:t>
+              <a:t>11/29/13</a:t>
             </a:fld>
             <a:endParaRPr lang="en-US"/>
           </a:p>
@@ -645,7 +1107,7 @@
           <a:p>
             <a:fld id="{68FEF4AB-F77E-2144-8AAF-8D88F8FB88C9}" type="datetimeFigureOut">
               <a:rPr lang="en-US" smtClean="0"/>
-              <a:t>11/26/13</a:t>
+              <a:t>11/29/13</a:t>
             </a:fld>
             <a:endParaRPr lang="en-US"/>
           </a:p>
@@ -815,7 +1277,7 @@
           <a:p>
             <a:fld id="{68FEF4AB-F77E-2144-8AAF-8D88F8FB88C9}" type="datetimeFigureOut">
               <a:rPr lang="en-US" smtClean="0"/>
-              <a:t>11/26/13</a:t>
+              <a:t>11/29/13</a:t>
             </a:fld>
             <a:endParaRPr lang="en-US"/>
           </a:p>
@@ -1061,7 +1523,7 @@
           <a:p>
             <a:fld id="{68FEF4AB-F77E-2144-8AAF-8D88F8FB88C9}" type="datetimeFigureOut">
               <a:rPr lang="en-US" smtClean="0"/>
-              <a:t>11/26/13</a:t>
+              <a:t>11/29/13</a:t>
             </a:fld>
             <a:endParaRPr lang="en-US"/>
           </a:p>
@@ -1349,7 +1811,7 @@
           <a:p>
             <a:fld id="{68FEF4AB-F77E-2144-8AAF-8D88F8FB88C9}" type="datetimeFigureOut">
               <a:rPr lang="en-US" smtClean="0"/>
-              <a:t>11/26/13</a:t>
+              <a:t>11/29/13</a:t>
             </a:fld>
             <a:endParaRPr lang="en-US"/>
           </a:p>
@@ -1771,7 +2233,7 @@
           <a:p>
             <a:fld id="{68FEF4AB-F77E-2144-8AAF-8D88F8FB88C9}" type="datetimeFigureOut">
               <a:rPr lang="en-US" smtClean="0"/>
-              <a:t>11/26/13</a:t>
+              <a:t>11/29/13</a:t>
             </a:fld>
             <a:endParaRPr lang="en-US"/>
           </a:p>
@@ -1889,7 +2351,7 @@
           <a:p>
             <a:fld id="{68FEF4AB-F77E-2144-8AAF-8D88F8FB88C9}" type="datetimeFigureOut">
               <a:rPr lang="en-US" smtClean="0"/>
-              <a:t>11/26/13</a:t>
+              <a:t>11/29/13</a:t>
             </a:fld>
             <a:endParaRPr lang="en-US"/>
           </a:p>
@@ -1984,7 +2446,7 @@
           <a:p>
             <a:fld id="{68FEF4AB-F77E-2144-8AAF-8D88F8FB88C9}" type="datetimeFigureOut">
               <a:rPr lang="en-US" smtClean="0"/>
-              <a:t>11/26/13</a:t>
+              <a:t>11/29/13</a:t>
             </a:fld>
             <a:endParaRPr lang="en-US"/>
           </a:p>
@@ -2261,7 +2723,7 @@
           <a:p>
             <a:fld id="{68FEF4AB-F77E-2144-8AAF-8D88F8FB88C9}" type="datetimeFigureOut">
               <a:rPr lang="en-US" smtClean="0"/>
-              <a:t>11/26/13</a:t>
+              <a:t>11/29/13</a:t>
             </a:fld>
             <a:endParaRPr lang="en-US"/>
           </a:p>
@@ -2514,7 +2976,7 @@
           <a:p>
             <a:fld id="{68FEF4AB-F77E-2144-8AAF-8D88F8FB88C9}" type="datetimeFigureOut">
               <a:rPr lang="en-US" smtClean="0"/>
-              <a:t>11/26/13</a:t>
+              <a:t>11/29/13</a:t>
             </a:fld>
             <a:endParaRPr lang="en-US"/>
           </a:p>
@@ -2727,7 +3189,7 @@
           <a:p>
             <a:fld id="{68FEF4AB-F77E-2144-8AAF-8D88F8FB88C9}" type="datetimeFigureOut">
               <a:rPr lang="en-US" smtClean="0"/>
-              <a:t>11/26/13</a:t>
+              <a:t>11/29/13</a:t>
             </a:fld>
             <a:endParaRPr lang="en-US"/>
           </a:p>
@@ -3161,6 +3623,1922 @@
 </p:sld>
 </file>
 
+<file path=ppt/slides/slide10.xml><?xml version="1.0" encoding="utf-8"?>
+<p:sld xmlns:a="http://schemas.openxmlformats.org/drawingml/2006/main" xmlns:r="http://schemas.openxmlformats.org/officeDocument/2006/relationships" xmlns:p="http://schemas.openxmlformats.org/presentationml/2006/main">
+  <p:cSld>
+    <p:spTree>
+      <p:nvGrpSpPr>
+        <p:cNvPr id="1" name=""/>
+        <p:cNvGrpSpPr/>
+        <p:nvPr/>
+      </p:nvGrpSpPr>
+      <p:grpSpPr>
+        <a:xfrm>
+          <a:off x="0" y="0"/>
+          <a:ext cx="0" cy="0"/>
+          <a:chOff x="0" y="0"/>
+          <a:chExt cx="0" cy="0"/>
+        </a:xfrm>
+      </p:grpSpPr>
+      <p:sp>
+        <p:nvSpPr>
+          <p:cNvPr id="2" name="Title 1"/>
+          <p:cNvSpPr>
+            <a:spLocks noGrp="1"/>
+          </p:cNvSpPr>
+          <p:nvPr>
+            <p:ph type="title"/>
+          </p:nvPr>
+        </p:nvSpPr>
+        <p:spPr/>
+        <p:txBody>
+          <a:bodyPr/>
+          <a:lstStyle/>
+          <a:p>
+            <a:r>
+              <a:rPr lang="en-US" smtClean="0"/>
+              <a:t>Don’t not do positives!</a:t>
+            </a:r>
+            <a:endParaRPr lang="en-US"/>
+          </a:p>
+        </p:txBody>
+      </p:sp>
+      <p:sp>
+        <p:nvSpPr>
+          <p:cNvPr id="6" name="TextBox 5"/>
+          <p:cNvSpPr txBox="1"/>
+          <p:nvPr/>
+        </p:nvSpPr>
+        <p:spPr>
+          <a:xfrm>
+            <a:off x="2463604" y="2108604"/>
+            <a:ext cx="2480930" cy="1754327"/>
+          </a:xfrm>
+          <a:prstGeom prst="rect">
+            <a:avLst/>
+          </a:prstGeom>
+          <a:noFill/>
+        </p:spPr>
+        <p:txBody>
+          <a:bodyPr wrap="none" rtlCol="0">
+            <a:spAutoFit/>
+          </a:bodyPr>
+          <a:lstStyle/>
+          <a:p>
+            <a:r>
+              <a:rPr lang="en-US" smtClean="0"/>
+              <a:t>function DataAvailable()</a:t>
+            </a:r>
+          </a:p>
+          <a:p>
+            <a:r>
+              <a:rPr lang="en-US" smtClean="0"/>
+              <a:t>{</a:t>
+            </a:r>
+          </a:p>
+          <a:p>
+            <a:r>
+              <a:rPr lang="en-US"/>
+              <a:t> </a:t>
+            </a:r>
+            <a:r>
+              <a:rPr lang="en-US" smtClean="0"/>
+              <a:t>  …</a:t>
+            </a:r>
+          </a:p>
+          <a:p>
+            <a:r>
+              <a:rPr lang="en-US" smtClean="0"/>
+              <a:t>}</a:t>
+            </a:r>
+          </a:p>
+          <a:p>
+            <a:endParaRPr lang="en-US"/>
+          </a:p>
+          <a:p>
+            <a:r>
+              <a:rPr lang="en-US" smtClean="0"/>
+              <a:t>if (DataAvailable()) ….</a:t>
+            </a:r>
+            <a:endParaRPr lang="en-US"/>
+          </a:p>
+        </p:txBody>
+      </p:sp>
+    </p:spTree>
+    <p:extLst>
+      <p:ext uri="{BB962C8B-B14F-4D97-AF65-F5344CB8AC3E}">
+        <p14:creationId xmlns:p14="http://schemas.microsoft.com/office/powerpoint/2010/main" val="3006262817"/>
+      </p:ext>
+    </p:extLst>
+  </p:cSld>
+  <p:clrMapOvr>
+    <a:masterClrMapping/>
+  </p:clrMapOvr>
+</p:sld>
+</file>
+
+<file path=ppt/slides/slide11.xml><?xml version="1.0" encoding="utf-8"?>
+<p:sld xmlns:a="http://schemas.openxmlformats.org/drawingml/2006/main" xmlns:r="http://schemas.openxmlformats.org/officeDocument/2006/relationships" xmlns:p="http://schemas.openxmlformats.org/presentationml/2006/main">
+  <p:cSld>
+    <p:spTree>
+      <p:nvGrpSpPr>
+        <p:cNvPr id="1" name=""/>
+        <p:cNvGrpSpPr/>
+        <p:nvPr/>
+      </p:nvGrpSpPr>
+      <p:grpSpPr>
+        <a:xfrm>
+          <a:off x="0" y="0"/>
+          <a:ext cx="0" cy="0"/>
+          <a:chOff x="0" y="0"/>
+          <a:chExt cx="0" cy="0"/>
+        </a:xfrm>
+      </p:grpSpPr>
+      <p:sp>
+        <p:nvSpPr>
+          <p:cNvPr id="2" name="Title 1"/>
+          <p:cNvSpPr>
+            <a:spLocks noGrp="1"/>
+          </p:cNvSpPr>
+          <p:nvPr>
+            <p:ph type="title"/>
+          </p:nvPr>
+        </p:nvSpPr>
+        <p:spPr/>
+        <p:txBody>
+          <a:bodyPr/>
+          <a:lstStyle/>
+          <a:p>
+            <a:r>
+              <a:rPr lang="en-US" smtClean="0"/>
+              <a:t>if condition then what?</a:t>
+            </a:r>
+            <a:endParaRPr lang="en-US"/>
+          </a:p>
+        </p:txBody>
+      </p:sp>
+      <p:sp>
+        <p:nvSpPr>
+          <p:cNvPr id="3" name="Content Placeholder 2"/>
+          <p:cNvSpPr>
+            <a:spLocks noGrp="1"/>
+          </p:cNvSpPr>
+          <p:nvPr>
+            <p:ph idx="1"/>
+          </p:nvPr>
+        </p:nvSpPr>
+        <p:spPr>
+          <a:xfrm>
+            <a:off x="457200" y="1600200"/>
+            <a:ext cx="8229600" cy="1222753"/>
+          </a:xfrm>
+        </p:spPr>
+        <p:txBody>
+          <a:bodyPr/>
+          <a:lstStyle/>
+          <a:p>
+            <a:r>
+              <a:rPr lang="en-US" smtClean="0"/>
+              <a:t>The most likely (expected) possibility should be the </a:t>
+            </a:r>
+            <a:r>
+              <a:rPr lang="en-US" b="1" smtClean="0"/>
+              <a:t>then statement </a:t>
+            </a:r>
+            <a:endParaRPr lang="en-US" b="1"/>
+          </a:p>
+        </p:txBody>
+      </p:sp>
+      <p:sp>
+        <p:nvSpPr>
+          <p:cNvPr id="4" name="TextBox 3"/>
+          <p:cNvSpPr txBox="1"/>
+          <p:nvPr/>
+        </p:nvSpPr>
+        <p:spPr>
+          <a:xfrm>
+            <a:off x="4544167" y="3571243"/>
+            <a:ext cx="2384337" cy="1200329"/>
+          </a:xfrm>
+          <a:prstGeom prst="rect">
+            <a:avLst/>
+          </a:prstGeom>
+          <a:noFill/>
+        </p:spPr>
+        <p:txBody>
+          <a:bodyPr wrap="none" rtlCol="0">
+            <a:spAutoFit/>
+          </a:bodyPr>
+          <a:lstStyle/>
+          <a:p>
+            <a:r>
+              <a:rPr lang="en-US" smtClean="0"/>
+              <a:t>if (!MoreDataAvailable)</a:t>
+            </a:r>
+          </a:p>
+          <a:p>
+            <a:r>
+              <a:rPr lang="en-US"/>
+              <a:t> </a:t>
+            </a:r>
+            <a:r>
+              <a:rPr lang="en-US" smtClean="0"/>
+              <a:t>  then </a:t>
+            </a:r>
+          </a:p>
+          <a:p>
+            <a:r>
+              <a:rPr lang="en-US"/>
+              <a:t> </a:t>
+            </a:r>
+            <a:r>
+              <a:rPr lang="en-US" smtClean="0"/>
+              <a:t>     {</a:t>
+            </a:r>
+          </a:p>
+          <a:p>
+            <a:r>
+              <a:rPr lang="en-US"/>
+              <a:t> </a:t>
+            </a:r>
+            <a:r>
+              <a:rPr lang="en-US" smtClean="0"/>
+              <a:t>     }</a:t>
+            </a:r>
+            <a:endParaRPr lang="en-US"/>
+          </a:p>
+        </p:txBody>
+      </p:sp>
+      <p:sp>
+        <p:nvSpPr>
+          <p:cNvPr id="5" name="TextBox 4"/>
+          <p:cNvSpPr txBox="1"/>
+          <p:nvPr/>
+        </p:nvSpPr>
+        <p:spPr>
+          <a:xfrm>
+            <a:off x="3797837" y="3858236"/>
+            <a:ext cx="437477" cy="369332"/>
+          </a:xfrm>
+          <a:prstGeom prst="rect">
+            <a:avLst/>
+          </a:prstGeom>
+          <a:noFill/>
+        </p:spPr>
+        <p:txBody>
+          <a:bodyPr wrap="none" rtlCol="0">
+            <a:spAutoFit/>
+          </a:bodyPr>
+          <a:lstStyle/>
+          <a:p>
+            <a:r>
+              <a:rPr lang="en-US" smtClean="0"/>
+              <a:t>vs.</a:t>
+            </a:r>
+            <a:endParaRPr lang="en-US"/>
+          </a:p>
+        </p:txBody>
+      </p:sp>
+      <p:sp>
+        <p:nvSpPr>
+          <p:cNvPr id="6" name="TextBox 5"/>
+          <p:cNvSpPr txBox="1"/>
+          <p:nvPr/>
+        </p:nvSpPr>
+        <p:spPr>
+          <a:xfrm>
+            <a:off x="1277908" y="3571243"/>
+            <a:ext cx="2309158" cy="1200329"/>
+          </a:xfrm>
+          <a:prstGeom prst="rect">
+            <a:avLst/>
+          </a:prstGeom>
+          <a:noFill/>
+        </p:spPr>
+        <p:txBody>
+          <a:bodyPr wrap="none" rtlCol="0">
+            <a:spAutoFit/>
+          </a:bodyPr>
+          <a:lstStyle/>
+          <a:p>
+            <a:r>
+              <a:rPr lang="en-US" smtClean="0"/>
+              <a:t>if (MoreDataAvailable)</a:t>
+            </a:r>
+          </a:p>
+          <a:p>
+            <a:r>
+              <a:rPr lang="en-US"/>
+              <a:t> </a:t>
+            </a:r>
+            <a:r>
+              <a:rPr lang="en-US" smtClean="0"/>
+              <a:t>  then </a:t>
+            </a:r>
+          </a:p>
+          <a:p>
+            <a:r>
+              <a:rPr lang="en-US"/>
+              <a:t> </a:t>
+            </a:r>
+            <a:r>
+              <a:rPr lang="en-US" smtClean="0"/>
+              <a:t>     {</a:t>
+            </a:r>
+          </a:p>
+          <a:p>
+            <a:r>
+              <a:rPr lang="en-US"/>
+              <a:t> </a:t>
+            </a:r>
+            <a:r>
+              <a:rPr lang="en-US" smtClean="0"/>
+              <a:t>     }</a:t>
+            </a:r>
+            <a:endParaRPr lang="en-US"/>
+          </a:p>
+        </p:txBody>
+      </p:sp>
+    </p:spTree>
+    <p:extLst>
+      <p:ext uri="{BB962C8B-B14F-4D97-AF65-F5344CB8AC3E}">
+        <p14:creationId xmlns:p14="http://schemas.microsoft.com/office/powerpoint/2010/main" val="1320202831"/>
+      </p:ext>
+    </p:extLst>
+  </p:cSld>
+  <p:clrMapOvr>
+    <a:masterClrMapping/>
+  </p:clrMapOvr>
+</p:sld>
+</file>
+
+<file path=ppt/slides/slide12.xml><?xml version="1.0" encoding="utf-8"?>
+<p:sld xmlns:a="http://schemas.openxmlformats.org/drawingml/2006/main" xmlns:r="http://schemas.openxmlformats.org/officeDocument/2006/relationships" xmlns:p="http://schemas.openxmlformats.org/presentationml/2006/main">
+  <p:cSld>
+    <p:spTree>
+      <p:nvGrpSpPr>
+        <p:cNvPr id="1" name=""/>
+        <p:cNvGrpSpPr/>
+        <p:nvPr/>
+      </p:nvGrpSpPr>
+      <p:grpSpPr>
+        <a:xfrm>
+          <a:off x="0" y="0"/>
+          <a:ext cx="0" cy="0"/>
+          <a:chOff x="0" y="0"/>
+          <a:chExt cx="0" cy="0"/>
+        </a:xfrm>
+      </p:grpSpPr>
+      <p:sp>
+        <p:nvSpPr>
+          <p:cNvPr id="2" name="Title 1"/>
+          <p:cNvSpPr>
+            <a:spLocks noGrp="1"/>
+          </p:cNvSpPr>
+          <p:nvPr>
+            <p:ph type="title"/>
+          </p:nvPr>
+        </p:nvSpPr>
+        <p:spPr/>
+        <p:txBody>
+          <a:bodyPr/>
+          <a:lstStyle/>
+          <a:p>
+            <a:r>
+              <a:rPr lang="en-US" smtClean="0"/>
+              <a:t>if condition then what?</a:t>
+            </a:r>
+            <a:endParaRPr lang="en-US"/>
+          </a:p>
+        </p:txBody>
+      </p:sp>
+      <p:sp>
+        <p:nvSpPr>
+          <p:cNvPr id="3" name="Content Placeholder 2"/>
+          <p:cNvSpPr>
+            <a:spLocks noGrp="1"/>
+          </p:cNvSpPr>
+          <p:nvPr>
+            <p:ph idx="1"/>
+          </p:nvPr>
+        </p:nvSpPr>
+        <p:spPr>
+          <a:xfrm>
+            <a:off x="457200" y="1600200"/>
+            <a:ext cx="8229600" cy="1222753"/>
+          </a:xfrm>
+        </p:spPr>
+        <p:txBody>
+          <a:bodyPr/>
+          <a:lstStyle/>
+          <a:p>
+            <a:r>
+              <a:rPr lang="en-US" smtClean="0"/>
+              <a:t>The most likely (expected) possibility should be the </a:t>
+            </a:r>
+            <a:r>
+              <a:rPr lang="en-US" b="1" smtClean="0"/>
+              <a:t>then statement </a:t>
+            </a:r>
+            <a:endParaRPr lang="en-US" b="1"/>
+          </a:p>
+        </p:txBody>
+      </p:sp>
+      <p:sp>
+        <p:nvSpPr>
+          <p:cNvPr id="4" name="TextBox 3"/>
+          <p:cNvSpPr txBox="1"/>
+          <p:nvPr/>
+        </p:nvSpPr>
+        <p:spPr>
+          <a:xfrm>
+            <a:off x="3490882" y="3571243"/>
+            <a:ext cx="1925715" cy="1754327"/>
+          </a:xfrm>
+          <a:prstGeom prst="rect">
+            <a:avLst/>
+          </a:prstGeom>
+          <a:noFill/>
+        </p:spPr>
+        <p:txBody>
+          <a:bodyPr wrap="none" rtlCol="0">
+            <a:spAutoFit/>
+          </a:bodyPr>
+          <a:lstStyle/>
+          <a:p>
+            <a:r>
+              <a:rPr lang="en-US"/>
+              <a:t>function </a:t>
+            </a:r>
+            <a:r>
+              <a:rPr lang="en-US"/>
+              <a:t>Process </a:t>
+            </a:r>
+            <a:r>
+              <a:rPr lang="en-US" smtClean="0"/>
+              <a:t>(</a:t>
+            </a:r>
+            <a:r>
+              <a:rPr lang="en-US"/>
+              <a:t>)</a:t>
+            </a:r>
+          </a:p>
+          <a:p>
+            <a:r>
+              <a:rPr lang="en-US"/>
+              <a:t>{</a:t>
+            </a:r>
+          </a:p>
+          <a:p>
+            <a:r>
+              <a:rPr lang="en-US"/>
+              <a:t>   error = …</a:t>
+            </a:r>
+          </a:p>
+          <a:p>
+            <a:r>
+              <a:rPr lang="en-US"/>
+              <a:t>   </a:t>
+            </a:r>
+            <a:r>
+              <a:rPr lang="en-US"/>
+              <a:t>if </a:t>
+            </a:r>
+            <a:r>
+              <a:rPr lang="en-US" smtClean="0"/>
+              <a:t>(!error</a:t>
+            </a:r>
+            <a:r>
+              <a:rPr lang="en-US"/>
+              <a:t>)</a:t>
+            </a:r>
+          </a:p>
+          <a:p>
+            <a:r>
+              <a:rPr lang="en-US"/>
+              <a:t>  </a:t>
+            </a:r>
+            <a:r>
+              <a:rPr lang="en-US"/>
+              <a:t> </a:t>
+            </a:r>
+            <a:r>
+              <a:rPr lang="en-US" smtClean="0"/>
+              <a:t>   then do </a:t>
+            </a:r>
+            <a:r>
+              <a:rPr lang="en-US"/>
+              <a:t>work</a:t>
+            </a:r>
+          </a:p>
+          <a:p>
+            <a:r>
+              <a:rPr lang="en-US"/>
+              <a:t>}  </a:t>
+            </a:r>
+            <a:endParaRPr lang="en-US"/>
+          </a:p>
+        </p:txBody>
+      </p:sp>
+      <p:sp>
+        <p:nvSpPr>
+          <p:cNvPr id="5" name="TextBox 4"/>
+          <p:cNvSpPr txBox="1"/>
+          <p:nvPr/>
+        </p:nvSpPr>
+        <p:spPr>
+          <a:xfrm>
+            <a:off x="2577917" y="4227568"/>
+            <a:ext cx="437477" cy="369332"/>
+          </a:xfrm>
+          <a:prstGeom prst="rect">
+            <a:avLst/>
+          </a:prstGeom>
+          <a:noFill/>
+        </p:spPr>
+        <p:txBody>
+          <a:bodyPr wrap="none" rtlCol="0">
+            <a:spAutoFit/>
+          </a:bodyPr>
+          <a:lstStyle/>
+          <a:p>
+            <a:r>
+              <a:rPr lang="en-US" smtClean="0"/>
+              <a:t>vs.</a:t>
+            </a:r>
+            <a:endParaRPr lang="en-US"/>
+          </a:p>
+        </p:txBody>
+      </p:sp>
+      <p:sp>
+        <p:nvSpPr>
+          <p:cNvPr id="6" name="TextBox 5"/>
+          <p:cNvSpPr txBox="1"/>
+          <p:nvPr/>
+        </p:nvSpPr>
+        <p:spPr>
+          <a:xfrm>
+            <a:off x="567693" y="3571243"/>
+            <a:ext cx="1873530" cy="2031325"/>
+          </a:xfrm>
+          <a:prstGeom prst="rect">
+            <a:avLst/>
+          </a:prstGeom>
+          <a:noFill/>
+        </p:spPr>
+        <p:txBody>
+          <a:bodyPr wrap="none" rtlCol="0">
+            <a:spAutoFit/>
+          </a:bodyPr>
+          <a:lstStyle/>
+          <a:p>
+            <a:r>
+              <a:rPr lang="en-US" smtClean="0"/>
+              <a:t>function Process()</a:t>
+            </a:r>
+          </a:p>
+          <a:p>
+            <a:r>
+              <a:rPr lang="en-US" smtClean="0"/>
+              <a:t>{</a:t>
+            </a:r>
+          </a:p>
+          <a:p>
+            <a:r>
+              <a:rPr lang="en-US"/>
+              <a:t> </a:t>
+            </a:r>
+            <a:r>
+              <a:rPr lang="en-US" smtClean="0"/>
+              <a:t>  error = …</a:t>
+            </a:r>
+          </a:p>
+          <a:p>
+            <a:r>
+              <a:rPr lang="en-US" smtClean="0"/>
+              <a:t>   if (error)</a:t>
+            </a:r>
+          </a:p>
+          <a:p>
+            <a:r>
+              <a:rPr lang="en-US"/>
+              <a:t> </a:t>
+            </a:r>
+            <a:r>
+              <a:rPr lang="en-US" smtClean="0"/>
+              <a:t>     then return</a:t>
+            </a:r>
+          </a:p>
+          <a:p>
+            <a:r>
+              <a:rPr lang="en-US"/>
+              <a:t> </a:t>
+            </a:r>
+            <a:r>
+              <a:rPr lang="en-US" smtClean="0"/>
+              <a:t>     else do work</a:t>
+            </a:r>
+          </a:p>
+          <a:p>
+            <a:r>
+              <a:rPr lang="en-US" smtClean="0"/>
+              <a:t>}  </a:t>
+            </a:r>
+            <a:endParaRPr lang="en-US"/>
+          </a:p>
+        </p:txBody>
+      </p:sp>
+      <p:sp>
+        <p:nvSpPr>
+          <p:cNvPr id="7" name="TextBox 6"/>
+          <p:cNvSpPr txBox="1"/>
+          <p:nvPr/>
+        </p:nvSpPr>
+        <p:spPr>
+          <a:xfrm>
+            <a:off x="6411912" y="3567086"/>
+            <a:ext cx="1925715" cy="1754327"/>
+          </a:xfrm>
+          <a:prstGeom prst="rect">
+            <a:avLst/>
+          </a:prstGeom>
+          <a:noFill/>
+        </p:spPr>
+        <p:txBody>
+          <a:bodyPr wrap="none" rtlCol="0">
+            <a:spAutoFit/>
+          </a:bodyPr>
+          <a:lstStyle/>
+          <a:p>
+            <a:r>
+              <a:rPr lang="en-US"/>
+              <a:t>function </a:t>
+            </a:r>
+            <a:r>
+              <a:rPr lang="en-US"/>
+              <a:t>Process </a:t>
+            </a:r>
+            <a:r>
+              <a:rPr lang="en-US" smtClean="0"/>
+              <a:t>(</a:t>
+            </a:r>
+            <a:r>
+              <a:rPr lang="en-US"/>
+              <a:t>)</a:t>
+            </a:r>
+          </a:p>
+          <a:p>
+            <a:r>
+              <a:rPr lang="en-US"/>
+              <a:t>{</a:t>
+            </a:r>
+          </a:p>
+          <a:p>
+            <a:r>
+              <a:rPr lang="en-US"/>
+              <a:t>  </a:t>
+            </a:r>
+            <a:r>
+              <a:rPr lang="en-US"/>
+              <a:t> </a:t>
+            </a:r>
+            <a:r>
+              <a:rPr lang="en-US" smtClean="0"/>
+              <a:t>ok= </a:t>
+            </a:r>
+            <a:r>
+              <a:rPr lang="en-US"/>
+              <a:t>…</a:t>
+            </a:r>
+          </a:p>
+          <a:p>
+            <a:r>
+              <a:rPr lang="en-US"/>
+              <a:t>   </a:t>
+            </a:r>
+            <a:r>
+              <a:rPr lang="en-US"/>
+              <a:t>if </a:t>
+            </a:r>
+            <a:r>
+              <a:rPr lang="en-US" smtClean="0"/>
+              <a:t>(ok)</a:t>
+            </a:r>
+            <a:endParaRPr lang="en-US"/>
+          </a:p>
+          <a:p>
+            <a:r>
+              <a:rPr lang="en-US"/>
+              <a:t>  </a:t>
+            </a:r>
+            <a:r>
+              <a:rPr lang="en-US"/>
+              <a:t> </a:t>
+            </a:r>
+            <a:r>
+              <a:rPr lang="en-US" smtClean="0"/>
+              <a:t>   then do </a:t>
+            </a:r>
+            <a:r>
+              <a:rPr lang="en-US"/>
+              <a:t>work</a:t>
+            </a:r>
+          </a:p>
+          <a:p>
+            <a:r>
+              <a:rPr lang="en-US"/>
+              <a:t>}  </a:t>
+            </a:r>
+            <a:endParaRPr lang="en-US"/>
+          </a:p>
+        </p:txBody>
+      </p:sp>
+      <p:sp>
+        <p:nvSpPr>
+          <p:cNvPr id="8" name="TextBox 7"/>
+          <p:cNvSpPr txBox="1"/>
+          <p:nvPr/>
+        </p:nvSpPr>
+        <p:spPr>
+          <a:xfrm>
+            <a:off x="5745715" y="4227568"/>
+            <a:ext cx="437477" cy="369332"/>
+          </a:xfrm>
+          <a:prstGeom prst="rect">
+            <a:avLst/>
+          </a:prstGeom>
+          <a:noFill/>
+        </p:spPr>
+        <p:txBody>
+          <a:bodyPr wrap="none" rtlCol="0">
+            <a:spAutoFit/>
+          </a:bodyPr>
+          <a:lstStyle/>
+          <a:p>
+            <a:r>
+              <a:rPr lang="en-US" smtClean="0"/>
+              <a:t>vs.</a:t>
+            </a:r>
+            <a:endParaRPr lang="en-US"/>
+          </a:p>
+        </p:txBody>
+      </p:sp>
+    </p:spTree>
+    <p:extLst>
+      <p:ext uri="{BB962C8B-B14F-4D97-AF65-F5344CB8AC3E}">
+        <p14:creationId xmlns:p14="http://schemas.microsoft.com/office/powerpoint/2010/main" val="3464118126"/>
+      </p:ext>
+    </p:extLst>
+  </p:cSld>
+  <p:clrMapOvr>
+    <a:masterClrMapping/>
+  </p:clrMapOvr>
+</p:sld>
+</file>
+
+<file path=ppt/slides/slide13.xml><?xml version="1.0" encoding="utf-8"?>
+<p:sld xmlns:a="http://schemas.openxmlformats.org/drawingml/2006/main" xmlns:r="http://schemas.openxmlformats.org/officeDocument/2006/relationships" xmlns:p="http://schemas.openxmlformats.org/presentationml/2006/main">
+  <p:cSld>
+    <p:spTree>
+      <p:nvGrpSpPr>
+        <p:cNvPr id="1" name=""/>
+        <p:cNvGrpSpPr/>
+        <p:nvPr/>
+      </p:nvGrpSpPr>
+      <p:grpSpPr>
+        <a:xfrm>
+          <a:off x="0" y="0"/>
+          <a:ext cx="0" cy="0"/>
+          <a:chOff x="0" y="0"/>
+          <a:chExt cx="0" cy="0"/>
+        </a:xfrm>
+      </p:grpSpPr>
+      <p:sp>
+        <p:nvSpPr>
+          <p:cNvPr id="2" name="Title 1"/>
+          <p:cNvSpPr>
+            <a:spLocks noGrp="1"/>
+          </p:cNvSpPr>
+          <p:nvPr>
+            <p:ph type="title"/>
+          </p:nvPr>
+        </p:nvSpPr>
+        <p:spPr/>
+        <p:txBody>
+          <a:bodyPr/>
+          <a:lstStyle/>
+          <a:p>
+            <a:r>
+              <a:rPr lang="en-US" smtClean="0"/>
+              <a:t>Assert statements</a:t>
+            </a:r>
+            <a:endParaRPr lang="en-US"/>
+          </a:p>
+        </p:txBody>
+      </p:sp>
+      <p:sp>
+        <p:nvSpPr>
+          <p:cNvPr id="3" name="Content Placeholder 2"/>
+          <p:cNvSpPr>
+            <a:spLocks noGrp="1"/>
+          </p:cNvSpPr>
+          <p:nvPr>
+            <p:ph idx="1"/>
+          </p:nvPr>
+        </p:nvSpPr>
+        <p:spPr>
+          <a:xfrm>
+            <a:off x="457200" y="1600201"/>
+            <a:ext cx="8229600" cy="1716318"/>
+          </a:xfrm>
+        </p:spPr>
+        <p:txBody>
+          <a:bodyPr/>
+          <a:lstStyle/>
+          <a:p>
+            <a:r>
+              <a:rPr lang="en-US" smtClean="0"/>
+              <a:t>Drown your code in them.</a:t>
+            </a:r>
+          </a:p>
+          <a:p>
+            <a:pPr lvl="1"/>
+            <a:r>
+              <a:rPr lang="en-US" smtClean="0"/>
+              <a:t>They can always be turned off at release time</a:t>
+            </a:r>
+          </a:p>
+          <a:p>
+            <a:pPr lvl="1"/>
+            <a:r>
+              <a:rPr lang="en-US" smtClean="0"/>
+              <a:t>But be VERY careful not to allow side effects</a:t>
+            </a:r>
+            <a:endParaRPr lang="en-US"/>
+          </a:p>
+        </p:txBody>
+      </p:sp>
+      <p:sp>
+        <p:nvSpPr>
+          <p:cNvPr id="4" name="TextBox 3"/>
+          <p:cNvSpPr txBox="1"/>
+          <p:nvPr/>
+        </p:nvSpPr>
+        <p:spPr>
+          <a:xfrm>
+            <a:off x="349088" y="3436900"/>
+            <a:ext cx="5420662" cy="1477328"/>
+          </a:xfrm>
+          <a:prstGeom prst="rect">
+            <a:avLst/>
+          </a:prstGeom>
+          <a:noFill/>
+        </p:spPr>
+        <p:txBody>
+          <a:bodyPr wrap="none" rtlCol="0">
+            <a:spAutoFit/>
+          </a:bodyPr>
+          <a:lstStyle/>
+          <a:p>
+            <a:r>
+              <a:rPr lang="en-US" smtClean="0"/>
+              <a:t>function LoadData() // Returns bool indicator of success</a:t>
+            </a:r>
+          </a:p>
+          <a:p>
+            <a:r>
+              <a:rPr lang="en-US" smtClean="0"/>
+              <a:t>{</a:t>
+            </a:r>
+          </a:p>
+          <a:p>
+            <a:r>
+              <a:rPr lang="en-US"/>
+              <a:t> </a:t>
+            </a:r>
+            <a:r>
+              <a:rPr lang="en-US" smtClean="0"/>
+              <a:t>  $dataLoaded = “Try and load the data….”</a:t>
+            </a:r>
+          </a:p>
+          <a:p>
+            <a:r>
+              <a:rPr lang="en-US"/>
+              <a:t> </a:t>
+            </a:r>
+            <a:r>
+              <a:rPr lang="en-US" smtClean="0"/>
+              <a:t>  return $dataLoaded;</a:t>
+            </a:r>
+          </a:p>
+          <a:p>
+            <a:r>
+              <a:rPr lang="en-US"/>
+              <a:t>}</a:t>
+            </a:r>
+          </a:p>
+        </p:txBody>
+      </p:sp>
+      <p:sp>
+        <p:nvSpPr>
+          <p:cNvPr id="5" name="TextBox 4"/>
+          <p:cNvSpPr txBox="1"/>
+          <p:nvPr/>
+        </p:nvSpPr>
+        <p:spPr>
+          <a:xfrm>
+            <a:off x="5230302" y="5290780"/>
+            <a:ext cx="2033467" cy="923330"/>
+          </a:xfrm>
+          <a:prstGeom prst="rect">
+            <a:avLst/>
+          </a:prstGeom>
+          <a:noFill/>
+        </p:spPr>
+        <p:txBody>
+          <a:bodyPr wrap="none" rtlCol="0">
+            <a:spAutoFit/>
+          </a:bodyPr>
+          <a:lstStyle/>
+          <a:p>
+            <a:r>
+              <a:rPr lang="en-US" smtClean="0"/>
+              <a:t>…</a:t>
+            </a:r>
+          </a:p>
+          <a:p>
+            <a:r>
+              <a:rPr lang="en-US" smtClean="0"/>
+              <a:t>assert (LoadData());</a:t>
+            </a:r>
+          </a:p>
+          <a:p>
+            <a:r>
+              <a:rPr lang="en-US" smtClean="0"/>
+              <a:t>…</a:t>
+            </a:r>
+            <a:endParaRPr lang="en-US"/>
+          </a:p>
+        </p:txBody>
+      </p:sp>
+      <p:sp>
+        <p:nvSpPr>
+          <p:cNvPr id="6" name="TextBox 5"/>
+          <p:cNvSpPr txBox="1"/>
+          <p:nvPr/>
+        </p:nvSpPr>
+        <p:spPr>
+          <a:xfrm>
+            <a:off x="7493355" y="5579696"/>
+            <a:ext cx="792517" cy="369332"/>
+          </a:xfrm>
+          <a:prstGeom prst="rect">
+            <a:avLst/>
+          </a:prstGeom>
+          <a:noFill/>
+        </p:spPr>
+        <p:txBody>
+          <a:bodyPr wrap="none" rtlCol="0">
+            <a:spAutoFit/>
+          </a:bodyPr>
+          <a:lstStyle/>
+          <a:p>
+            <a:r>
+              <a:rPr lang="en-US" smtClean="0">
+                <a:solidFill>
+                  <a:srgbClr val="FF0000"/>
+                </a:solidFill>
+              </a:rPr>
+              <a:t>Ooops</a:t>
+            </a:r>
+            <a:endParaRPr lang="en-US">
+              <a:solidFill>
+                <a:srgbClr val="FF0000"/>
+              </a:solidFill>
+            </a:endParaRPr>
+          </a:p>
+        </p:txBody>
+      </p:sp>
+    </p:spTree>
+    <p:extLst>
+      <p:ext uri="{BB962C8B-B14F-4D97-AF65-F5344CB8AC3E}">
+        <p14:creationId xmlns:p14="http://schemas.microsoft.com/office/powerpoint/2010/main" val="2612427584"/>
+      </p:ext>
+    </p:extLst>
+  </p:cSld>
+  <p:clrMapOvr>
+    <a:masterClrMapping/>
+  </p:clrMapOvr>
+</p:sld>
+</file>
+
+<file path=ppt/slides/slide14.xml><?xml version="1.0" encoding="utf-8"?>
+<p:sld xmlns:a="http://schemas.openxmlformats.org/drawingml/2006/main" xmlns:r="http://schemas.openxmlformats.org/officeDocument/2006/relationships" xmlns:p="http://schemas.openxmlformats.org/presentationml/2006/main">
+  <p:cSld>
+    <p:spTree>
+      <p:nvGrpSpPr>
+        <p:cNvPr id="1" name=""/>
+        <p:cNvGrpSpPr/>
+        <p:nvPr/>
+      </p:nvGrpSpPr>
+      <p:grpSpPr>
+        <a:xfrm>
+          <a:off x="0" y="0"/>
+          <a:ext cx="0" cy="0"/>
+          <a:chOff x="0" y="0"/>
+          <a:chExt cx="0" cy="0"/>
+        </a:xfrm>
+      </p:grpSpPr>
+      <p:sp>
+        <p:nvSpPr>
+          <p:cNvPr id="5" name="TextBox 4"/>
+          <p:cNvSpPr txBox="1"/>
+          <p:nvPr/>
+        </p:nvSpPr>
+        <p:spPr>
+          <a:xfrm>
+            <a:off x="523632" y="499585"/>
+            <a:ext cx="7842443" cy="3139321"/>
+          </a:xfrm>
+          <a:prstGeom prst="rect">
+            <a:avLst/>
+          </a:prstGeom>
+          <a:noFill/>
+        </p:spPr>
+        <p:txBody>
+          <a:bodyPr wrap="square" rtlCol="0">
+            <a:spAutoFit/>
+          </a:bodyPr>
+          <a:lstStyle/>
+          <a:p>
+            <a:r>
+              <a:rPr lang="en-US" smtClean="0"/>
+              <a:t>function foo($aNumber, $aPointer)</a:t>
+            </a:r>
+          </a:p>
+          <a:p>
+            <a:r>
+              <a:rPr lang="en-US" smtClean="0"/>
+              <a:t>{</a:t>
+            </a:r>
+          </a:p>
+          <a:p>
+            <a:r>
+              <a:rPr lang="en-US" smtClean="0"/>
+              <a:t>   assert</a:t>
+            </a:r>
+            <a:r>
+              <a:rPr lang="en-US"/>
+              <a:t>($aNumber &gt; 0); // I don’t work with </a:t>
+            </a:r>
+            <a:r>
+              <a:rPr lang="en-US"/>
+              <a:t>negative </a:t>
+            </a:r>
+            <a:r>
+              <a:rPr lang="en-US" smtClean="0"/>
+              <a:t>numbers</a:t>
+            </a:r>
+          </a:p>
+          <a:p>
+            <a:r>
+              <a:rPr lang="en-US" smtClean="0"/>
+              <a:t>   assert($aPointer != null); // I’m not testing for this, caller needs to make sure</a:t>
+            </a:r>
+          </a:p>
+          <a:p>
+            <a:r>
+              <a:rPr lang="en-US" smtClean="0"/>
+              <a:t>  </a:t>
+            </a:r>
+          </a:p>
+          <a:p>
+            <a:r>
+              <a:rPr lang="en-US"/>
+              <a:t> </a:t>
+            </a:r>
+            <a:r>
+              <a:rPr lang="en-US" smtClean="0"/>
+              <a:t>  $result = …..</a:t>
+            </a:r>
+          </a:p>
+          <a:p>
+            <a:endParaRPr lang="en-US"/>
+          </a:p>
+          <a:p>
+            <a:r>
+              <a:rPr lang="en-US" smtClean="0"/>
+              <a:t>   assert ($result &lt; 0); // Whatever this function does, </a:t>
+            </a:r>
+          </a:p>
+          <a:p>
+            <a:r>
+              <a:rPr lang="en-US"/>
+              <a:t> </a:t>
+            </a:r>
+            <a:r>
+              <a:rPr lang="en-US" smtClean="0"/>
+              <a:t>                                     //the answer is always supposed to be negative</a:t>
+            </a:r>
+          </a:p>
+          <a:p>
+            <a:r>
+              <a:rPr lang="en-US"/>
+              <a:t> </a:t>
+            </a:r>
+            <a:r>
+              <a:rPr lang="en-US" smtClean="0"/>
+              <a:t>  return $result;</a:t>
+            </a:r>
+          </a:p>
+          <a:p>
+            <a:r>
+              <a:rPr lang="en-US"/>
+              <a:t>}</a:t>
+            </a:r>
+          </a:p>
+        </p:txBody>
+      </p:sp>
+      <p:sp>
+        <p:nvSpPr>
+          <p:cNvPr id="6" name="TextBox 5"/>
+          <p:cNvSpPr txBox="1"/>
+          <p:nvPr/>
+        </p:nvSpPr>
+        <p:spPr>
+          <a:xfrm>
+            <a:off x="686139" y="4863424"/>
+            <a:ext cx="7045518" cy="369332"/>
+          </a:xfrm>
+          <a:prstGeom prst="rect">
+            <a:avLst/>
+          </a:prstGeom>
+          <a:noFill/>
+        </p:spPr>
+        <p:txBody>
+          <a:bodyPr wrap="none" rtlCol="0">
+            <a:spAutoFit/>
+          </a:bodyPr>
+          <a:lstStyle/>
+          <a:p>
+            <a:pPr marL="285750" indent="-285750">
+              <a:buFont typeface="Arial"/>
+              <a:buChar char="•"/>
+            </a:pPr>
+            <a:r>
+              <a:rPr lang="en-US" smtClean="0">
+                <a:solidFill>
+                  <a:srgbClr val="FF0000"/>
+                </a:solidFill>
+              </a:rPr>
+              <a:t>It’s ok to change/remove an assert later if/when functionality changes</a:t>
+            </a:r>
+            <a:endParaRPr lang="en-US">
+              <a:solidFill>
+                <a:srgbClr val="FF0000"/>
+              </a:solidFill>
+            </a:endParaRPr>
+          </a:p>
+        </p:txBody>
+      </p:sp>
+    </p:spTree>
+    <p:extLst>
+      <p:ext uri="{BB962C8B-B14F-4D97-AF65-F5344CB8AC3E}">
+        <p14:creationId xmlns:p14="http://schemas.microsoft.com/office/powerpoint/2010/main" val="1831370498"/>
+      </p:ext>
+    </p:extLst>
+  </p:cSld>
+  <p:clrMapOvr>
+    <a:masterClrMapping/>
+  </p:clrMapOvr>
+</p:sld>
+</file>
+
+<file path=ppt/slides/slide15.xml><?xml version="1.0" encoding="utf-8"?>
+<p:sld xmlns:a="http://schemas.openxmlformats.org/drawingml/2006/main" xmlns:r="http://schemas.openxmlformats.org/officeDocument/2006/relationships" xmlns:p="http://schemas.openxmlformats.org/presentationml/2006/main">
+  <p:cSld>
+    <p:spTree>
+      <p:nvGrpSpPr>
+        <p:cNvPr id="1" name=""/>
+        <p:cNvGrpSpPr/>
+        <p:nvPr/>
+      </p:nvGrpSpPr>
+      <p:grpSpPr>
+        <a:xfrm>
+          <a:off x="0" y="0"/>
+          <a:ext cx="0" cy="0"/>
+          <a:chOff x="0" y="0"/>
+          <a:chExt cx="0" cy="0"/>
+        </a:xfrm>
+      </p:grpSpPr>
+      <p:sp>
+        <p:nvSpPr>
+          <p:cNvPr id="2" name="Title 1"/>
+          <p:cNvSpPr>
+            <a:spLocks noGrp="1"/>
+          </p:cNvSpPr>
+          <p:nvPr>
+            <p:ph type="title"/>
+          </p:nvPr>
+        </p:nvSpPr>
+        <p:spPr/>
+        <p:txBody>
+          <a:bodyPr/>
+          <a:lstStyle/>
+          <a:p>
+            <a:r>
+              <a:rPr lang="en-US" dirty="0" smtClean="0"/>
+              <a:t>Refactoring</a:t>
+            </a:r>
+            <a:endParaRPr lang="en-US" dirty="0"/>
+          </a:p>
+        </p:txBody>
+      </p:sp>
+      <p:sp>
+        <p:nvSpPr>
+          <p:cNvPr id="3" name="Content Placeholder 2"/>
+          <p:cNvSpPr>
+            <a:spLocks noGrp="1"/>
+          </p:cNvSpPr>
+          <p:nvPr>
+            <p:ph idx="1"/>
+          </p:nvPr>
+        </p:nvSpPr>
+        <p:spPr/>
+        <p:txBody>
+          <a:bodyPr/>
+          <a:lstStyle/>
+          <a:p>
+            <a:r>
+              <a:rPr lang="en-US" dirty="0" smtClean="0"/>
+              <a:t>Variable renaming</a:t>
+            </a:r>
+          </a:p>
+          <a:p>
+            <a:r>
+              <a:rPr lang="en-US" dirty="0" smtClean="0"/>
+              <a:t>Class member renaming</a:t>
+            </a:r>
+          </a:p>
+          <a:p>
+            <a:r>
+              <a:rPr lang="en-US" dirty="0" smtClean="0"/>
+              <a:t>Method extraction</a:t>
+            </a:r>
+          </a:p>
+          <a:p>
+            <a:r>
+              <a:rPr lang="en-US" dirty="0" smtClean="0"/>
+              <a:t>Field encapsulation</a:t>
+            </a:r>
+          </a:p>
+          <a:p>
+            <a:r>
+              <a:rPr lang="en-US" dirty="0" smtClean="0"/>
+              <a:t>Moving methods up/down the hierarchy</a:t>
+            </a:r>
+            <a:endParaRPr lang="en-US" dirty="0"/>
+          </a:p>
+        </p:txBody>
+      </p:sp>
+    </p:spTree>
+    <p:extLst>
+      <p:ext uri="{BB962C8B-B14F-4D97-AF65-F5344CB8AC3E}">
+        <p14:creationId xmlns:p14="http://schemas.microsoft.com/office/powerpoint/2010/main" val="3936916481"/>
+      </p:ext>
+    </p:extLst>
+  </p:cSld>
+  <p:clrMapOvr>
+    <a:masterClrMapping/>
+  </p:clrMapOvr>
+</p:sld>
+</file>
+
+<file path=ppt/slides/slide16.xml><?xml version="1.0" encoding="utf-8"?>
+<p:sld xmlns:a="http://schemas.openxmlformats.org/drawingml/2006/main" xmlns:r="http://schemas.openxmlformats.org/officeDocument/2006/relationships" xmlns:p="http://schemas.openxmlformats.org/presentationml/2006/main">
+  <p:cSld>
+    <p:spTree>
+      <p:nvGrpSpPr>
+        <p:cNvPr id="1" name=""/>
+        <p:cNvGrpSpPr/>
+        <p:nvPr/>
+      </p:nvGrpSpPr>
+      <p:grpSpPr>
+        <a:xfrm>
+          <a:off x="0" y="0"/>
+          <a:ext cx="0" cy="0"/>
+          <a:chOff x="0" y="0"/>
+          <a:chExt cx="0" cy="0"/>
+        </a:xfrm>
+      </p:grpSpPr>
+      <p:sp>
+        <p:nvSpPr>
+          <p:cNvPr id="2" name="Title 1"/>
+          <p:cNvSpPr>
+            <a:spLocks noGrp="1"/>
+          </p:cNvSpPr>
+          <p:nvPr>
+            <p:ph type="title"/>
+          </p:nvPr>
+        </p:nvSpPr>
+        <p:spPr/>
+        <p:txBody>
+          <a:bodyPr/>
+          <a:lstStyle/>
+          <a:p>
+            <a:r>
+              <a:rPr lang="en-US" dirty="0" smtClean="0"/>
+              <a:t>Functions</a:t>
+            </a:r>
+            <a:endParaRPr lang="en-US" dirty="0"/>
+          </a:p>
+        </p:txBody>
+      </p:sp>
+      <p:sp>
+        <p:nvSpPr>
+          <p:cNvPr id="3" name="Content Placeholder 2"/>
+          <p:cNvSpPr>
+            <a:spLocks noGrp="1"/>
+          </p:cNvSpPr>
+          <p:nvPr>
+            <p:ph idx="1"/>
+          </p:nvPr>
+        </p:nvSpPr>
+        <p:spPr/>
+        <p:txBody>
+          <a:bodyPr/>
+          <a:lstStyle/>
+          <a:p>
+            <a:r>
+              <a:rPr lang="en-US" dirty="0" smtClean="0"/>
+              <a:t>If you have more than 12-15 lines of code, </a:t>
+            </a:r>
+            <a:r>
+              <a:rPr lang="en-US" dirty="0" smtClean="0"/>
+              <a:t>refactor to </a:t>
+            </a:r>
+            <a:r>
+              <a:rPr lang="en-US" dirty="0" smtClean="0"/>
+              <a:t>a function</a:t>
+            </a:r>
+          </a:p>
+          <a:p>
+            <a:pPr lvl="1"/>
+            <a:r>
+              <a:rPr lang="en-US" dirty="0" smtClean="0"/>
+              <a:t>Rule of thumb</a:t>
+            </a:r>
+          </a:p>
+          <a:p>
+            <a:pPr lvl="1"/>
+            <a:r>
+              <a:rPr lang="en-US" dirty="0" smtClean="0"/>
+              <a:t>Sometimes you might only have 2 lines</a:t>
+            </a:r>
+            <a:r>
+              <a:rPr lang="en-US" dirty="0" smtClean="0"/>
+              <a:t>!</a:t>
+            </a:r>
+            <a:endParaRPr lang="en-US" dirty="0"/>
+          </a:p>
+          <a:p>
+            <a:pPr lvl="2"/>
+            <a:r>
+              <a:rPr lang="en-US" dirty="0" smtClean="0"/>
+              <a:t>Still easier to read</a:t>
+            </a:r>
+          </a:p>
+        </p:txBody>
+      </p:sp>
+      <p:sp>
+        <p:nvSpPr>
+          <p:cNvPr id="4" name="TextBox 3"/>
+          <p:cNvSpPr txBox="1"/>
+          <p:nvPr/>
+        </p:nvSpPr>
+        <p:spPr>
+          <a:xfrm>
+            <a:off x="841531" y="4797061"/>
+            <a:ext cx="6931156" cy="1200329"/>
+          </a:xfrm>
+          <a:prstGeom prst="rect">
+            <a:avLst/>
+          </a:prstGeom>
+          <a:noFill/>
+        </p:spPr>
+        <p:txBody>
+          <a:bodyPr wrap="square" rtlCol="0">
+            <a:spAutoFit/>
+          </a:bodyPr>
+          <a:lstStyle/>
+          <a:p>
+            <a:r>
+              <a:rPr lang="en-US" i="1" dirty="0"/>
+              <a:t>Good code invariably has small methods and small objects…no one thing I do to systems provides as much help as breaking it into more pieces </a:t>
+            </a:r>
+            <a:endParaRPr lang="en-US" dirty="0"/>
+          </a:p>
+          <a:p>
+            <a:r>
+              <a:rPr lang="en-US" dirty="0"/>
+              <a:t>— Kent Beck</a:t>
+            </a:r>
+          </a:p>
+          <a:p>
+            <a:endParaRPr lang="en-US" dirty="0"/>
+          </a:p>
+        </p:txBody>
+      </p:sp>
+    </p:spTree>
+    <p:extLst>
+      <p:ext uri="{BB962C8B-B14F-4D97-AF65-F5344CB8AC3E}">
+        <p14:creationId xmlns:p14="http://schemas.microsoft.com/office/powerpoint/2010/main" val="1221347506"/>
+      </p:ext>
+    </p:extLst>
+  </p:cSld>
+  <p:clrMapOvr>
+    <a:masterClrMapping/>
+  </p:clrMapOvr>
+</p:sld>
+</file>
+
+<file path=ppt/slides/slide17.xml><?xml version="1.0" encoding="utf-8"?>
+<p:sld xmlns:a="http://schemas.openxmlformats.org/drawingml/2006/main" xmlns:r="http://schemas.openxmlformats.org/officeDocument/2006/relationships" xmlns:p="http://schemas.openxmlformats.org/presentationml/2006/main">
+  <p:cSld>
+    <p:spTree>
+      <p:nvGrpSpPr>
+        <p:cNvPr id="1" name=""/>
+        <p:cNvGrpSpPr/>
+        <p:nvPr/>
+      </p:nvGrpSpPr>
+      <p:grpSpPr>
+        <a:xfrm>
+          <a:off x="0" y="0"/>
+          <a:ext cx="0" cy="0"/>
+          <a:chOff x="0" y="0"/>
+          <a:chExt cx="0" cy="0"/>
+        </a:xfrm>
+      </p:grpSpPr>
+      <p:sp>
+        <p:nvSpPr>
+          <p:cNvPr id="2" name="Title 1"/>
+          <p:cNvSpPr>
+            <a:spLocks noGrp="1"/>
+          </p:cNvSpPr>
+          <p:nvPr>
+            <p:ph type="title"/>
+          </p:nvPr>
+        </p:nvSpPr>
+        <p:spPr/>
+        <p:txBody>
+          <a:bodyPr/>
+          <a:lstStyle/>
+          <a:p>
+            <a:r>
+              <a:rPr lang="en-US" dirty="0" smtClean="0"/>
+              <a:t>Techniques</a:t>
+            </a:r>
+            <a:endParaRPr lang="en-US" dirty="0"/>
+          </a:p>
+        </p:txBody>
+      </p:sp>
+      <p:sp>
+        <p:nvSpPr>
+          <p:cNvPr id="3" name="Content Placeholder 2"/>
+          <p:cNvSpPr>
+            <a:spLocks noGrp="1"/>
+          </p:cNvSpPr>
+          <p:nvPr>
+            <p:ph idx="1"/>
+          </p:nvPr>
+        </p:nvSpPr>
+        <p:spPr/>
+        <p:txBody>
+          <a:bodyPr>
+            <a:normAutofit fontScale="92500" lnSpcReduction="10000"/>
+          </a:bodyPr>
+          <a:lstStyle/>
+          <a:p>
+            <a:r>
+              <a:rPr lang="en-US" dirty="0" smtClean="0"/>
+              <a:t>Assertions</a:t>
+            </a:r>
+          </a:p>
+          <a:p>
+            <a:pPr lvl="1"/>
+            <a:r>
+              <a:rPr lang="en-US" dirty="0" smtClean="0"/>
+              <a:t>Preconditions</a:t>
+            </a:r>
+          </a:p>
+          <a:p>
+            <a:pPr lvl="1"/>
+            <a:r>
+              <a:rPr lang="en-US" dirty="0" smtClean="0"/>
+              <a:t>Postconditions</a:t>
+            </a:r>
+          </a:p>
+          <a:p>
+            <a:r>
+              <a:rPr lang="en-US" dirty="0" smtClean="0"/>
+              <a:t>Refactoring</a:t>
+            </a:r>
+          </a:p>
+          <a:p>
+            <a:r>
+              <a:rPr lang="en-US" dirty="0" smtClean="0"/>
+              <a:t>Premature optimization === very bad!</a:t>
+            </a:r>
+          </a:p>
+          <a:p>
+            <a:r>
+              <a:rPr lang="en-US" dirty="0" smtClean="0"/>
+              <a:t>Static vs. runtime checking</a:t>
+            </a:r>
+          </a:p>
+          <a:p>
+            <a:r>
+              <a:rPr lang="en-US" dirty="0" smtClean="0"/>
+              <a:t>Type checking</a:t>
+            </a:r>
+          </a:p>
+          <a:p>
+            <a:r>
+              <a:rPr lang="en-US" dirty="0" err="1" smtClean="0"/>
+              <a:t>Fenceposts</a:t>
+            </a:r>
+            <a:endParaRPr lang="en-US" dirty="0" smtClean="0"/>
+          </a:p>
+          <a:p>
+            <a:r>
+              <a:rPr lang="en-US" dirty="0" smtClean="0"/>
+              <a:t>&gt;= better than = (why)</a:t>
+            </a:r>
+          </a:p>
+          <a:p>
+            <a:endParaRPr lang="en-US" dirty="0"/>
+          </a:p>
+        </p:txBody>
+      </p:sp>
+    </p:spTree>
+    <p:extLst>
+      <p:ext uri="{BB962C8B-B14F-4D97-AF65-F5344CB8AC3E}">
+        <p14:creationId xmlns:p14="http://schemas.microsoft.com/office/powerpoint/2010/main" val="1237644620"/>
+      </p:ext>
+    </p:extLst>
+  </p:cSld>
+  <p:clrMapOvr>
+    <a:masterClrMapping/>
+  </p:clrMapOvr>
+</p:sld>
+</file>
+
+<file path=ppt/slides/slide18.xml><?xml version="1.0" encoding="utf-8"?>
+<p:sld xmlns:a="http://schemas.openxmlformats.org/drawingml/2006/main" xmlns:r="http://schemas.openxmlformats.org/officeDocument/2006/relationships" xmlns:p="http://schemas.openxmlformats.org/presentationml/2006/main">
+  <p:cSld>
+    <p:spTree>
+      <p:nvGrpSpPr>
+        <p:cNvPr id="1" name=""/>
+        <p:cNvGrpSpPr/>
+        <p:nvPr/>
+      </p:nvGrpSpPr>
+      <p:grpSpPr>
+        <a:xfrm>
+          <a:off x="0" y="0"/>
+          <a:ext cx="0" cy="0"/>
+          <a:chOff x="0" y="0"/>
+          <a:chExt cx="0" cy="0"/>
+        </a:xfrm>
+      </p:grpSpPr>
+      <p:sp>
+        <p:nvSpPr>
+          <p:cNvPr id="2" name="Title 1"/>
+          <p:cNvSpPr>
+            <a:spLocks noGrp="1"/>
+          </p:cNvSpPr>
+          <p:nvPr>
+            <p:ph type="title"/>
+          </p:nvPr>
+        </p:nvSpPr>
+        <p:spPr/>
+        <p:txBody>
+          <a:bodyPr/>
+          <a:lstStyle/>
+          <a:p>
+            <a:r>
+              <a:rPr lang="en-US" dirty="0" smtClean="0"/>
+              <a:t>Encapsulate low-level APIs</a:t>
+            </a:r>
+            <a:endParaRPr lang="en-US" dirty="0"/>
+          </a:p>
+        </p:txBody>
+      </p:sp>
+      <p:sp>
+        <p:nvSpPr>
+          <p:cNvPr id="3" name="Content Placeholder 2"/>
+          <p:cNvSpPr>
+            <a:spLocks noGrp="1"/>
+          </p:cNvSpPr>
+          <p:nvPr>
+            <p:ph idx="1"/>
+          </p:nvPr>
+        </p:nvSpPr>
+        <p:spPr/>
+        <p:txBody>
+          <a:bodyPr/>
+          <a:lstStyle/>
+          <a:p>
+            <a:r>
+              <a:rPr lang="en-US" dirty="0" smtClean="0"/>
+              <a:t>Build high-level APIs to suit your intent</a:t>
+            </a:r>
+          </a:p>
+          <a:p>
+            <a:r>
+              <a:rPr lang="en-US" dirty="0" smtClean="0"/>
+              <a:t>APIs </a:t>
+            </a:r>
+            <a:r>
+              <a:rPr lang="en-US" dirty="0" smtClean="0"/>
+              <a:t>are normally presented as low level building blocks</a:t>
+            </a:r>
+          </a:p>
+          <a:p>
+            <a:r>
+              <a:rPr lang="en-US" dirty="0" smtClean="0"/>
+              <a:t>Wrap them in parameterized functions</a:t>
+            </a:r>
+          </a:p>
+          <a:p>
+            <a:pPr lvl="1"/>
+            <a:r>
+              <a:rPr lang="en-US" dirty="0" smtClean="0"/>
+              <a:t>Even better, use classes</a:t>
+            </a:r>
+            <a:endParaRPr lang="en-US" dirty="0"/>
+          </a:p>
+        </p:txBody>
+      </p:sp>
+    </p:spTree>
+    <p:extLst>
+      <p:ext uri="{BB962C8B-B14F-4D97-AF65-F5344CB8AC3E}">
+        <p14:creationId xmlns:p14="http://schemas.microsoft.com/office/powerpoint/2010/main" val="3930462537"/>
+      </p:ext>
+    </p:extLst>
+  </p:cSld>
+  <p:clrMapOvr>
+    <a:masterClrMapping/>
+  </p:clrMapOvr>
+</p:sld>
+</file>
+
+<file path=ppt/slides/slide19.xml><?xml version="1.0" encoding="utf-8"?>
+<p:sld xmlns:a="http://schemas.openxmlformats.org/drawingml/2006/main" xmlns:r="http://schemas.openxmlformats.org/officeDocument/2006/relationships" xmlns:p="http://schemas.openxmlformats.org/presentationml/2006/main">
+  <p:cSld>
+    <p:spTree>
+      <p:nvGrpSpPr>
+        <p:cNvPr id="1" name=""/>
+        <p:cNvGrpSpPr/>
+        <p:nvPr/>
+      </p:nvGrpSpPr>
+      <p:grpSpPr>
+        <a:xfrm>
+          <a:off x="0" y="0"/>
+          <a:ext cx="0" cy="0"/>
+          <a:chOff x="0" y="0"/>
+          <a:chExt cx="0" cy="0"/>
+        </a:xfrm>
+      </p:grpSpPr>
+      <p:sp>
+        <p:nvSpPr>
+          <p:cNvPr id="2" name="Title 1"/>
+          <p:cNvSpPr>
+            <a:spLocks noGrp="1"/>
+          </p:cNvSpPr>
+          <p:nvPr>
+            <p:ph type="title"/>
+          </p:nvPr>
+        </p:nvSpPr>
+        <p:spPr/>
+        <p:txBody>
+          <a:bodyPr/>
+          <a:lstStyle/>
+          <a:p>
+            <a:r>
+              <a:rPr lang="en-US" dirty="0" smtClean="0"/>
+              <a:t>Version 1</a:t>
+            </a:r>
+            <a:endParaRPr lang="en-US" dirty="0"/>
+          </a:p>
+        </p:txBody>
+      </p:sp>
+      <p:sp>
+        <p:nvSpPr>
+          <p:cNvPr id="4" name="TextBox 3"/>
+          <p:cNvSpPr txBox="1"/>
+          <p:nvPr/>
+        </p:nvSpPr>
+        <p:spPr>
+          <a:xfrm>
+            <a:off x="651003" y="1417638"/>
+            <a:ext cx="7931931" cy="1200329"/>
+          </a:xfrm>
+          <a:prstGeom prst="rect">
+            <a:avLst/>
+          </a:prstGeom>
+          <a:noFill/>
+        </p:spPr>
+        <p:txBody>
+          <a:bodyPr wrap="square" rtlCol="0">
+            <a:spAutoFit/>
+          </a:bodyPr>
+          <a:lstStyle/>
+          <a:p>
+            <a:r>
+              <a:rPr lang="en-US" dirty="0" smtClean="0"/>
+              <a:t>http://</a:t>
+            </a:r>
+            <a:r>
+              <a:rPr lang="en-US" dirty="0" err="1" smtClean="0"/>
+              <a:t>api.flickr.com</a:t>
+            </a:r>
+            <a:r>
+              <a:rPr lang="en-US" dirty="0" smtClean="0"/>
+              <a:t>/services/rest/?format=</a:t>
+            </a:r>
+            <a:r>
+              <a:rPr lang="en-US" dirty="0" err="1" smtClean="0"/>
+              <a:t>json&amp;method</a:t>
+            </a:r>
+            <a:r>
+              <a:rPr lang="en-US" dirty="0" smtClean="0"/>
+              <a:t>=</a:t>
+            </a:r>
+            <a:r>
+              <a:rPr lang="en-US" dirty="0" err="1" smtClean="0"/>
+              <a:t>flickr.photos.search&amp;user_id</a:t>
+            </a:r>
+            <a:r>
+              <a:rPr lang="en-US" dirty="0" smtClean="0"/>
+              <a:t>=24878717%40N06&amp;sort=</a:t>
+            </a:r>
+            <a:r>
+              <a:rPr lang="en-US" dirty="0" err="1" smtClean="0"/>
+              <a:t>date-taken-desc&amp;api_key</a:t>
+            </a:r>
+            <a:r>
+              <a:rPr lang="en-US" dirty="0" smtClean="0"/>
+              <a:t>=[API Key]</a:t>
+            </a:r>
+          </a:p>
+          <a:p>
+            <a:endParaRPr lang="en-US" dirty="0"/>
+          </a:p>
+        </p:txBody>
+      </p:sp>
+      <p:sp>
+        <p:nvSpPr>
+          <p:cNvPr id="5" name="TextBox 4"/>
+          <p:cNvSpPr txBox="1"/>
+          <p:nvPr/>
+        </p:nvSpPr>
+        <p:spPr>
+          <a:xfrm>
+            <a:off x="651003" y="3043742"/>
+            <a:ext cx="7701514" cy="2031325"/>
+          </a:xfrm>
+          <a:prstGeom prst="rect">
+            <a:avLst/>
+          </a:prstGeom>
+          <a:noFill/>
+        </p:spPr>
+        <p:txBody>
+          <a:bodyPr wrap="square" rtlCol="0">
+            <a:spAutoFit/>
+          </a:bodyPr>
+          <a:lstStyle/>
+          <a:p>
+            <a:r>
+              <a:rPr lang="en-US" dirty="0" smtClean="0"/>
+              <a:t>Function </a:t>
+            </a:r>
+            <a:r>
+              <a:rPr lang="en-US" dirty="0" err="1" smtClean="0"/>
+              <a:t>SearchPhoto</a:t>
+            </a:r>
+            <a:r>
+              <a:rPr lang="en-US" dirty="0" smtClean="0"/>
+              <a:t>($</a:t>
+            </a:r>
+            <a:r>
+              <a:rPr lang="en-US" dirty="0" err="1" smtClean="0"/>
+              <a:t>userid</a:t>
+            </a:r>
+            <a:r>
+              <a:rPr lang="en-US" dirty="0" smtClean="0"/>
+              <a:t>, $sort, $key)</a:t>
+            </a:r>
+          </a:p>
+          <a:p>
+            <a:r>
+              <a:rPr lang="en-US" dirty="0" smtClean="0"/>
+              <a:t>{</a:t>
+            </a:r>
+          </a:p>
+          <a:p>
+            <a:r>
+              <a:rPr lang="en-US" dirty="0"/>
+              <a:t> </a:t>
+            </a:r>
+            <a:r>
+              <a:rPr lang="en-US" dirty="0" smtClean="0"/>
+              <a:t>  $query= “http://api.flickr.com/services/rest/?</a:t>
+            </a:r>
+          </a:p>
+          <a:p>
+            <a:r>
+              <a:rPr lang="en-US" dirty="0"/>
+              <a:t> </a:t>
+            </a:r>
+            <a:r>
+              <a:rPr lang="en-US" dirty="0" smtClean="0"/>
+              <a:t>                   format=</a:t>
+            </a:r>
+            <a:r>
+              <a:rPr lang="en-US" dirty="0" err="1" smtClean="0"/>
+              <a:t>json&amp;method</a:t>
+            </a:r>
+            <a:r>
+              <a:rPr lang="en-US" dirty="0" smtClean="0"/>
+              <a:t>=</a:t>
+            </a:r>
+            <a:r>
+              <a:rPr lang="en-US" dirty="0" err="1" smtClean="0"/>
+              <a:t>flickr.photos.search&amp;user_id</a:t>
+            </a:r>
+            <a:r>
+              <a:rPr lang="en-US" dirty="0" smtClean="0"/>
+              <a:t>=$</a:t>
+            </a:r>
+            <a:r>
+              <a:rPr lang="en-US" dirty="0" err="1" smtClean="0"/>
+              <a:t>userid&amp;sort</a:t>
+            </a:r>
+            <a:r>
+              <a:rPr lang="en-US" dirty="0" smtClean="0"/>
+              <a:t>=</a:t>
+            </a:r>
+          </a:p>
+          <a:p>
+            <a:r>
+              <a:rPr lang="en-US" dirty="0"/>
+              <a:t> </a:t>
+            </a:r>
+            <a:r>
+              <a:rPr lang="en-US" dirty="0" smtClean="0"/>
+              <a:t>                   $</a:t>
+            </a:r>
+            <a:r>
+              <a:rPr lang="en-US" dirty="0" err="1" smtClean="0"/>
+              <a:t>sort&amp;api_key</a:t>
+            </a:r>
+            <a:r>
+              <a:rPr lang="en-US" dirty="0" smtClean="0"/>
+              <a:t>=$key”;</a:t>
+            </a:r>
+          </a:p>
+          <a:p>
+            <a:r>
+              <a:rPr lang="en-US" dirty="0"/>
+              <a:t> </a:t>
+            </a:r>
+            <a:r>
+              <a:rPr lang="en-US" dirty="0" smtClean="0"/>
+              <a:t>  return $query;</a:t>
+            </a:r>
+          </a:p>
+          <a:p>
+            <a:r>
+              <a:rPr lang="en-US" dirty="0" smtClean="0"/>
+              <a:t>}</a:t>
+            </a:r>
+            <a:endParaRPr lang="en-US" dirty="0"/>
+          </a:p>
+        </p:txBody>
+      </p:sp>
+    </p:spTree>
+    <p:extLst>
+      <p:ext uri="{BB962C8B-B14F-4D97-AF65-F5344CB8AC3E}">
+        <p14:creationId xmlns:p14="http://schemas.microsoft.com/office/powerpoint/2010/main" val="482382423"/>
+      </p:ext>
+    </p:extLst>
+  </p:cSld>
+  <p:clrMapOvr>
+    <a:masterClrMapping/>
+  </p:clrMapOvr>
+</p:sld>
+</file>
+
 <file path=ppt/slides/slide2.xml><?xml version="1.0" encoding="utf-8"?>
 <p:sld xmlns:a="http://schemas.openxmlformats.org/drawingml/2006/main" xmlns:r="http://schemas.openxmlformats.org/officeDocument/2006/relationships" xmlns:p="http://schemas.openxmlformats.org/presentationml/2006/main">
   <p:cSld>
@@ -3211,14 +5589,27 @@
             <p:ph idx="1"/>
           </p:nvPr>
         </p:nvSpPr>
-        <p:spPr/>
-        <p:txBody>
-          <a:bodyPr/>
-          <a:lstStyle/>
-          <a:p>
-            <a:r>
-              <a:rPr lang="en-US" dirty="0" smtClean="0"/>
-              <a:t>Reduce errors</a:t>
+        <p:spPr>
+          <a:xfrm>
+            <a:off x="457200" y="1600200"/>
+            <a:ext cx="8229600" cy="2956682"/>
+          </a:xfrm>
+        </p:spPr>
+        <p:txBody>
+          <a:bodyPr>
+            <a:normAutofit fontScale="92500" lnSpcReduction="20000"/>
+          </a:bodyPr>
+          <a:lstStyle/>
+          <a:p>
+            <a:r>
+              <a:rPr lang="en-US" dirty="0" smtClean="0"/>
+              <a:t>Develop faster</a:t>
+            </a:r>
+          </a:p>
+          <a:p>
+            <a:r>
+              <a:rPr lang="en-US" dirty="0" smtClean="0"/>
+              <a:t>Reduce probability of introducing errors</a:t>
             </a:r>
           </a:p>
           <a:p>
@@ -3230,8 +5621,64 @@
           <a:p>
             <a:r>
               <a:rPr lang="en-US" dirty="0" smtClean="0"/>
-              <a:t>Speed up development</a:t>
-            </a:r>
+              <a:t>Support evolutionary development</a:t>
+            </a:r>
+          </a:p>
+          <a:p>
+            <a:endParaRPr lang="en-US" dirty="0"/>
+          </a:p>
+          <a:p>
+            <a:r>
+              <a:rPr lang="en-US" dirty="0" smtClean="0"/>
+              <a:t>Literate programming</a:t>
+            </a:r>
+            <a:endParaRPr lang="en-US" dirty="0"/>
+          </a:p>
+        </p:txBody>
+      </p:sp>
+      <p:sp>
+        <p:nvSpPr>
+          <p:cNvPr id="4" name="TextBox 3"/>
+          <p:cNvSpPr txBox="1"/>
+          <p:nvPr/>
+        </p:nvSpPr>
+        <p:spPr>
+          <a:xfrm>
+            <a:off x="1430168" y="4791661"/>
+            <a:ext cx="6168931" cy="1200329"/>
+          </a:xfrm>
+          <a:prstGeom prst="rect">
+            <a:avLst/>
+          </a:prstGeom>
+          <a:noFill/>
+        </p:spPr>
+        <p:txBody>
+          <a:bodyPr wrap="square" rtlCol="0">
+            <a:spAutoFit/>
+          </a:bodyPr>
+          <a:lstStyle/>
+          <a:p>
+            <a:r>
+              <a:rPr lang="en-US" i="1" dirty="0"/>
+              <a:t>Programs must be written for people to read, and only incidentally for machines to execute</a:t>
+            </a:r>
+            <a:r>
+              <a:rPr lang="en-US" dirty="0"/>
+              <a:t>.</a:t>
+            </a:r>
+          </a:p>
+          <a:p>
+            <a:r>
+              <a:rPr lang="en-US" dirty="0"/>
+              <a:t>- Abelson / </a:t>
+            </a:r>
+            <a:r>
+              <a:rPr lang="en-US" dirty="0" err="1"/>
+              <a:t>Sussman</a:t>
+            </a:r>
+            <a:endParaRPr lang="en-US" dirty="0"/>
+          </a:p>
+          <a:p>
             <a:endParaRPr lang="en-US" dirty="0"/>
           </a:p>
         </p:txBody>
@@ -3283,7 +5730,7 @@
           <a:p>
             <a:r>
               <a:rPr lang="en-US" dirty="0" smtClean="0"/>
-              <a:t>Techniques</a:t>
+              <a:t>Abstraction</a:t>
             </a:r>
             <a:endParaRPr lang="en-US" dirty="0"/>
           </a:p>
@@ -3301,68 +5748,42 @@
         </p:nvSpPr>
         <p:spPr/>
         <p:txBody>
-          <a:bodyPr>
-            <a:normAutofit fontScale="92500" lnSpcReduction="10000"/>
-          </a:bodyPr>
-          <a:lstStyle/>
-          <a:p>
-            <a:r>
-              <a:rPr lang="en-US" dirty="0" smtClean="0"/>
-              <a:t>Assertions</a:t>
-            </a:r>
-          </a:p>
-          <a:p>
-            <a:pPr lvl="1"/>
-            <a:r>
-              <a:rPr lang="en-US" dirty="0" smtClean="0"/>
-              <a:t>Preconditions</a:t>
-            </a:r>
-          </a:p>
-          <a:p>
-            <a:pPr lvl="1"/>
-            <a:r>
-              <a:rPr lang="en-US" dirty="0" smtClean="0"/>
-              <a:t>Postconditions</a:t>
-            </a:r>
-          </a:p>
-          <a:p>
-            <a:r>
-              <a:rPr lang="en-US" dirty="0" smtClean="0"/>
-              <a:t>Refactoring</a:t>
-            </a:r>
-          </a:p>
-          <a:p>
-            <a:r>
-              <a:rPr lang="en-US" dirty="0" smtClean="0"/>
-              <a:t>Premature optimization === very bad!</a:t>
-            </a:r>
-          </a:p>
-          <a:p>
-            <a:r>
-              <a:rPr lang="en-US" dirty="0" smtClean="0"/>
-              <a:t>Static vs. runtime checking</a:t>
-            </a:r>
-          </a:p>
-          <a:p>
-            <a:r>
-              <a:rPr lang="en-US" dirty="0" smtClean="0"/>
-              <a:t>Type checking</a:t>
-            </a:r>
-          </a:p>
-          <a:p>
-            <a:r>
-              <a:rPr lang="en-US" dirty="0" err="1" smtClean="0"/>
-              <a:t>Fenceposts</a:t>
-            </a:r>
-            <a:endParaRPr lang="en-US" dirty="0" smtClean="0"/>
-          </a:p>
-          <a:p>
-            <a:r>
-              <a:rPr lang="en-US" dirty="0" smtClean="0"/>
-              <a:t>&gt;= better than = (why)</a:t>
-            </a:r>
-          </a:p>
-          <a:p>
+          <a:bodyPr/>
+          <a:lstStyle/>
+          <a:p>
+            <a:r>
+              <a:rPr lang="en-US" dirty="0" smtClean="0"/>
+              <a:t>Intent, not mechanism</a:t>
+            </a:r>
+          </a:p>
+          <a:p>
+            <a:r>
+              <a:rPr lang="en-US" dirty="0" smtClean="0"/>
+              <a:t>At each level, describe what you want</a:t>
+            </a:r>
+          </a:p>
+          <a:p>
+            <a:r>
+              <a:rPr lang="en-US" dirty="0" smtClean="0"/>
+              <a:t>Don’t think at implementation level</a:t>
+            </a:r>
+          </a:p>
+          <a:p>
+            <a:endParaRPr lang="en-US" dirty="0"/>
+          </a:p>
+          <a:p>
+            <a:r>
+              <a:rPr lang="en-US" dirty="0"/>
+              <a:t>f</a:t>
+            </a:r>
+            <a:r>
+              <a:rPr lang="en-US" smtClean="0"/>
+              <a:t>oo</a:t>
+            </a:r>
+            <a:r>
+              <a:rPr lang="en-US" dirty="0" smtClean="0"/>
+              <a:t>-&gt;Print()</a:t>
+            </a:r>
             <a:endParaRPr lang="en-US" dirty="0"/>
           </a:p>
         </p:txBody>
@@ -3370,7 +5791,7 @@
     </p:spTree>
     <p:extLst>
       <p:ext uri="{BB962C8B-B14F-4D97-AF65-F5344CB8AC3E}">
-        <p14:creationId xmlns:p14="http://schemas.microsoft.com/office/powerpoint/2010/main" val="1237644620"/>
+        <p14:creationId xmlns:p14="http://schemas.microsoft.com/office/powerpoint/2010/main" val="934612772"/>
       </p:ext>
     </p:extLst>
   </p:cSld>
@@ -3414,7 +5835,7 @@
           <a:p>
             <a:r>
               <a:rPr lang="en-US" dirty="0" smtClean="0"/>
-              <a:t>Top-down design</a:t>
+              <a:t>Don’t be too clever</a:t>
             </a:r>
             <a:endParaRPr lang="en-US" dirty="0"/>
           </a:p>
@@ -3422,22 +5843,54 @@
       </p:sp>
       <p:sp>
         <p:nvSpPr>
-          <p:cNvPr id="3" name="Content Placeholder 2"/>
-          <p:cNvSpPr>
-            <a:spLocks noGrp="1"/>
-          </p:cNvSpPr>
-          <p:nvPr>
-            <p:ph idx="1"/>
-          </p:nvPr>
-        </p:nvSpPr>
-        <p:spPr/>
-        <p:txBody>
-          <a:bodyPr/>
-          <a:lstStyle/>
-          <a:p>
-            <a:r>
-              <a:rPr lang="en-US" dirty="0" smtClean="0"/>
-              <a:t>Build from the outside – assume you’ve got all the lower level functionality</a:t>
+          <p:cNvPr id="5" name="TextBox 4"/>
+          <p:cNvSpPr txBox="1"/>
+          <p:nvPr/>
+        </p:nvSpPr>
+        <p:spPr>
+          <a:xfrm>
+            <a:off x="821813" y="2603932"/>
+            <a:ext cx="7104264" cy="1754327"/>
+          </a:xfrm>
+          <a:prstGeom prst="rect">
+            <a:avLst/>
+          </a:prstGeom>
+          <a:noFill/>
+        </p:spPr>
+        <p:txBody>
+          <a:bodyPr wrap="square" rtlCol="0">
+            <a:spAutoFit/>
+          </a:bodyPr>
+          <a:lstStyle/>
+          <a:p>
+            <a:r>
+              <a:rPr lang="en-US" i="1" dirty="0"/>
+              <a:t>Debugging is twice as hard as writing the code in the first place. Therefore, if you</a:t>
+            </a:r>
+            <a:r>
+              <a:rPr lang="en-US" dirty="0"/>
+              <a:t> </a:t>
+            </a:r>
+            <a:r>
+              <a:rPr lang="en-US" i="1" dirty="0"/>
+              <a:t>write the code as cleverly as possible, you are, by definition, not smart enough to debug it</a:t>
+            </a:r>
+            <a:r>
+              <a:rPr lang="en-US" dirty="0" smtClean="0"/>
+              <a:t>.</a:t>
+            </a:r>
+          </a:p>
+          <a:p>
+            <a:endParaRPr lang="en-US" dirty="0"/>
+          </a:p>
+          <a:p>
+            <a:r>
+              <a:rPr lang="en-US" dirty="0" smtClean="0"/>
+              <a:t>Brian </a:t>
+            </a:r>
+            <a:r>
+              <a:rPr lang="en-US" dirty="0"/>
+              <a:t>Kernighan</a:t>
             </a:r>
           </a:p>
           <a:p>
@@ -3448,7 +5901,7 @@
     </p:spTree>
     <p:extLst>
       <p:ext uri="{BB962C8B-B14F-4D97-AF65-F5344CB8AC3E}">
-        <p14:creationId xmlns:p14="http://schemas.microsoft.com/office/powerpoint/2010/main" val="347672257"/>
+        <p14:creationId xmlns:p14="http://schemas.microsoft.com/office/powerpoint/2010/main" val="1185001242"/>
       </p:ext>
     </p:extLst>
   </p:cSld>
@@ -3492,7 +5945,7 @@
           <a:p>
             <a:r>
               <a:rPr lang="en-US" dirty="0" smtClean="0"/>
-              <a:t>Basic blocks</a:t>
+              <a:t>Top-down design</a:t>
             </a:r>
             <a:endParaRPr lang="en-US" dirty="0"/>
           </a:p>
@@ -3515,21 +5968,17 @@
           <a:p>
             <a:r>
               <a:rPr lang="en-US" dirty="0" smtClean="0"/>
-              <a:t>Single entry/single return</a:t>
-            </a:r>
-          </a:p>
-          <a:p>
-            <a:pPr lvl="1"/>
-            <a:r>
-              <a:rPr lang="en-US" dirty="0" smtClean="0"/>
-              <a:t>Start at the top, end at the bottom</a:t>
-            </a:r>
-          </a:p>
-          <a:p>
-            <a:pPr lvl="1"/>
-            <a:r>
-              <a:rPr lang="en-US" dirty="0" smtClean="0"/>
-              <a:t>Never return from the middle</a:t>
+              <a:t>Build from the outside – assume you’ve got all the lower level </a:t>
+            </a:r>
+            <a:r>
+              <a:rPr lang="en-US" dirty="0" smtClean="0"/>
+              <a:t>functionality</a:t>
+            </a:r>
+          </a:p>
+          <a:p>
+            <a:r>
+              <a:rPr lang="en-US" dirty="0" smtClean="0"/>
+              <a:t>Understand program without having to read every line of code</a:t>
             </a:r>
             <a:endParaRPr lang="en-US" dirty="0" smtClean="0"/>
           </a:p>
@@ -3541,7 +5990,7 @@
     </p:spTree>
     <p:extLst>
       <p:ext uri="{BB962C8B-B14F-4D97-AF65-F5344CB8AC3E}">
-        <p14:creationId xmlns:p14="http://schemas.microsoft.com/office/powerpoint/2010/main" val="1049061332"/>
+        <p14:creationId xmlns:p14="http://schemas.microsoft.com/office/powerpoint/2010/main" val="347672257"/>
       </p:ext>
     </p:extLst>
   </p:cSld>
@@ -3570,68 +6019,348 @@
       </p:grpSpPr>
       <p:sp>
         <p:nvSpPr>
-          <p:cNvPr id="2" name="Title 1"/>
-          <p:cNvSpPr>
-            <a:spLocks noGrp="1"/>
-          </p:cNvSpPr>
-          <p:nvPr>
-            <p:ph type="title"/>
-          </p:nvPr>
-        </p:nvSpPr>
-        <p:spPr/>
-        <p:txBody>
-          <a:bodyPr/>
-          <a:lstStyle/>
-          <a:p>
-            <a:r>
-              <a:rPr lang="en-US" dirty="0" smtClean="0"/>
-              <a:t>Functions</a:t>
-            </a:r>
-            <a:endParaRPr lang="en-US" dirty="0"/>
-          </a:p>
-        </p:txBody>
-      </p:sp>
-      <p:sp>
-        <p:nvSpPr>
-          <p:cNvPr id="3" name="Content Placeholder 2"/>
-          <p:cNvSpPr>
-            <a:spLocks noGrp="1"/>
-          </p:cNvSpPr>
-          <p:nvPr>
-            <p:ph idx="1"/>
-          </p:nvPr>
-        </p:nvSpPr>
-        <p:spPr/>
-        <p:txBody>
-          <a:bodyPr/>
-          <a:lstStyle/>
-          <a:p>
-            <a:r>
-              <a:rPr lang="en-US" dirty="0" smtClean="0"/>
-              <a:t>If you have more than 12-15 lines of code, convert it to a function</a:t>
-            </a:r>
-          </a:p>
-          <a:p>
-            <a:pPr lvl="1"/>
-            <a:r>
-              <a:rPr lang="en-US" dirty="0" smtClean="0"/>
-              <a:t>Rule of thumb</a:t>
-            </a:r>
-          </a:p>
-          <a:p>
-            <a:pPr lvl="1"/>
-            <a:r>
-              <a:rPr lang="en-US" dirty="0" smtClean="0"/>
-              <a:t>Sometimes you might only have 2 lines!</a:t>
-            </a:r>
-            <a:endParaRPr lang="en-US" dirty="0"/>
+          <p:cNvPr id="2" name="TextBox 1"/>
+          <p:cNvSpPr txBox="1"/>
+          <p:nvPr/>
+        </p:nvSpPr>
+        <p:spPr>
+          <a:xfrm>
+            <a:off x="61203" y="117692"/>
+            <a:ext cx="8522414" cy="6740308"/>
+          </a:xfrm>
+          <a:prstGeom prst="rect">
+            <a:avLst/>
+          </a:prstGeom>
+          <a:noFill/>
+        </p:spPr>
+        <p:txBody>
+          <a:bodyPr wrap="square" rtlCol="0">
+            <a:spAutoFit/>
+          </a:bodyPr>
+          <a:lstStyle/>
+          <a:p>
+            <a:r>
+              <a:rPr lang="en-US" dirty="0" smtClean="0"/>
+              <a:t>try</a:t>
+            </a:r>
+          </a:p>
+          <a:p>
+            <a:r>
+              <a:rPr lang="en-US" dirty="0" smtClean="0"/>
+              <a:t>   {</a:t>
+            </a:r>
+          </a:p>
+          <a:p>
+            <a:r>
+              <a:rPr lang="en-US" dirty="0" smtClean="0"/>
+              <a:t>      $</a:t>
+            </a:r>
+            <a:r>
+              <a:rPr lang="en-US" dirty="0" err="1" smtClean="0"/>
+              <a:t>mysqli</a:t>
+            </a:r>
+            <a:r>
+              <a:rPr lang="en-US" dirty="0" smtClean="0"/>
+              <a:t> = new </a:t>
+            </a:r>
+            <a:r>
+              <a:rPr lang="en-US" dirty="0" err="1" smtClean="0"/>
+              <a:t>mysqli</a:t>
+            </a:r>
+            <a:r>
+              <a:rPr lang="en-US" dirty="0" smtClean="0"/>
+              <a:t>(“</a:t>
+            </a:r>
+            <a:r>
+              <a:rPr lang="en-US" dirty="0" err="1" smtClean="0"/>
+              <a:t>MyHost</a:t>
+            </a:r>
+            <a:r>
+              <a:rPr lang="en-US" dirty="0" smtClean="0"/>
+              <a:t>”, “</a:t>
+            </a:r>
+            <a:r>
+              <a:rPr lang="en-US" dirty="0" err="1" smtClean="0"/>
+              <a:t>xyzzy</a:t>
+            </a:r>
+            <a:r>
+              <a:rPr lang="en-US" dirty="0" smtClean="0"/>
+              <a:t>”, “</a:t>
+            </a:r>
+            <a:r>
+              <a:rPr lang="en-US" dirty="0" err="1" smtClean="0"/>
+              <a:t>SomePassword</a:t>
+            </a:r>
+            <a:r>
+              <a:rPr lang="en-US" dirty="0" smtClean="0"/>
+              <a:t>”, “</a:t>
+            </a:r>
+            <a:r>
+              <a:rPr lang="en-US" dirty="0" err="1" smtClean="0"/>
+              <a:t>NamesAndAddresses</a:t>
+            </a:r>
+            <a:r>
+              <a:rPr lang="en-US" dirty="0" smtClean="0"/>
+              <a:t>”);</a:t>
+            </a:r>
+          </a:p>
+          <a:p>
+            <a:r>
+              <a:rPr lang="en-US" dirty="0" smtClean="0"/>
+              <a:t>   </a:t>
+            </a:r>
+            <a:r>
+              <a:rPr lang="en-US" dirty="0"/>
+              <a:t>}</a:t>
+            </a:r>
+          </a:p>
+          <a:p>
+            <a:r>
+              <a:rPr lang="en-US" dirty="0" smtClean="0"/>
+              <a:t>catch </a:t>
+            </a:r>
+            <a:r>
+              <a:rPr lang="en-US" dirty="0"/>
+              <a:t>(Exception $e)</a:t>
+            </a:r>
+          </a:p>
+          <a:p>
+            <a:r>
+              <a:rPr lang="en-US" dirty="0" smtClean="0"/>
+              <a:t>   </a:t>
+            </a:r>
+            <a:r>
+              <a:rPr lang="en-US" dirty="0"/>
+              <a:t>{</a:t>
+            </a:r>
+          </a:p>
+          <a:p>
+            <a:r>
+              <a:rPr lang="en-US" dirty="0" smtClean="0"/>
+              <a:t>      </a:t>
+            </a:r>
+            <a:r>
+              <a:rPr lang="en-US" dirty="0"/>
+              <a:t>throw new Exception("MySQL connection failed\n\</a:t>
+            </a:r>
+            <a:r>
+              <a:rPr lang="en-US" dirty="0" err="1"/>
+              <a:t>n$e</a:t>
+            </a:r>
+            <a:r>
+              <a:rPr lang="en-US" dirty="0"/>
+              <a:t>");</a:t>
+            </a:r>
+          </a:p>
+          <a:p>
+            <a:r>
+              <a:rPr lang="en-US" dirty="0" smtClean="0"/>
+              <a:t>   </a:t>
+            </a:r>
+            <a:r>
+              <a:rPr lang="en-US" dirty="0"/>
+              <a:t>}</a:t>
+            </a:r>
+          </a:p>
+          <a:p>
+            <a:r>
+              <a:rPr lang="en-US" dirty="0" smtClean="0"/>
+              <a:t>assert</a:t>
+            </a:r>
+            <a:r>
+              <a:rPr lang="en-US" dirty="0"/>
+              <a:t>( $</a:t>
+            </a:r>
+            <a:r>
+              <a:rPr lang="en-US" dirty="0" err="1"/>
+              <a:t>mysqli</a:t>
+            </a:r>
+            <a:r>
+              <a:rPr lang="en-US" dirty="0"/>
+              <a:t> </a:t>
+            </a:r>
+            <a:r>
+              <a:rPr lang="en-US" dirty="0" err="1"/>
+              <a:t>instanceof</a:t>
+            </a:r>
+            <a:r>
+              <a:rPr lang="en-US" dirty="0"/>
+              <a:t> </a:t>
+            </a:r>
+            <a:r>
+              <a:rPr lang="en-US" dirty="0" err="1"/>
+              <a:t>mysqli</a:t>
+            </a:r>
+            <a:r>
+              <a:rPr lang="en-US" dirty="0"/>
+              <a:t> ); </a:t>
+            </a:r>
+            <a:endParaRPr lang="en-US" dirty="0" smtClean="0"/>
+          </a:p>
+          <a:p>
+            <a:r>
+              <a:rPr lang="en-US" dirty="0" smtClean="0"/>
+              <a:t>try</a:t>
+            </a:r>
+          </a:p>
+          <a:p>
+            <a:r>
+              <a:rPr lang="en-US" dirty="0" smtClean="0"/>
+              <a:t>   {</a:t>
+            </a:r>
+          </a:p>
+          <a:p>
+            <a:r>
+              <a:rPr lang="en-US" dirty="0"/>
+              <a:t> </a:t>
+            </a:r>
+            <a:r>
+              <a:rPr lang="en-US" dirty="0" smtClean="0"/>
+              <a:t>     $rows = $</a:t>
+            </a:r>
+            <a:r>
+              <a:rPr lang="en-US" dirty="0" err="1" smtClean="0"/>
+              <a:t>mysqli</a:t>
+            </a:r>
+            <a:r>
+              <a:rPr lang="en-US" dirty="0" smtClean="0"/>
+              <a:t>-&gt;query(“select * from Addresses order by Surname”);</a:t>
+            </a:r>
+          </a:p>
+          <a:p>
+            <a:r>
+              <a:rPr lang="en-US" dirty="0"/>
+              <a:t> </a:t>
+            </a:r>
+            <a:r>
+              <a:rPr lang="en-US" dirty="0" smtClean="0"/>
+              <a:t>  }</a:t>
+            </a:r>
+          </a:p>
+          <a:p>
+            <a:r>
+              <a:rPr lang="en-US" dirty="0" smtClean="0"/>
+              <a:t>catch (Exception $e)</a:t>
+            </a:r>
+          </a:p>
+          <a:p>
+            <a:r>
+              <a:rPr lang="en-US" dirty="0"/>
+              <a:t> </a:t>
+            </a:r>
+            <a:r>
+              <a:rPr lang="en-US" dirty="0" smtClean="0"/>
+              <a:t>  {</a:t>
+            </a:r>
+          </a:p>
+          <a:p>
+            <a:r>
+              <a:rPr lang="en-US" dirty="0"/>
+              <a:t> </a:t>
+            </a:r>
+            <a:r>
+              <a:rPr lang="en-US" dirty="0" smtClean="0"/>
+              <a:t>  }</a:t>
+            </a:r>
+          </a:p>
+          <a:p>
+            <a:r>
+              <a:rPr lang="en-US" dirty="0" smtClean="0"/>
+              <a:t>if ($rows-&gt;</a:t>
+            </a:r>
+            <a:r>
+              <a:rPr lang="en-US" dirty="0" err="1" smtClean="0"/>
+              <a:t>num_rows</a:t>
+            </a:r>
+            <a:r>
+              <a:rPr lang="en-US" dirty="0" smtClean="0"/>
+              <a:t> &gt; 0)</a:t>
+            </a:r>
+          </a:p>
+          <a:p>
+            <a:r>
+              <a:rPr lang="en-US" dirty="0"/>
+              <a:t> </a:t>
+            </a:r>
+            <a:r>
+              <a:rPr lang="en-US" dirty="0" smtClean="0"/>
+              <a:t>  //then</a:t>
+            </a:r>
+          </a:p>
+          <a:p>
+            <a:r>
+              <a:rPr lang="en-US" dirty="0"/>
+              <a:t> </a:t>
+            </a:r>
+            <a:r>
+              <a:rPr lang="en-US" dirty="0" smtClean="0"/>
+              <a:t>     {</a:t>
+            </a:r>
+          </a:p>
+          <a:p>
+            <a:r>
+              <a:rPr lang="en-US" dirty="0"/>
+              <a:t> </a:t>
+            </a:r>
+            <a:r>
+              <a:rPr lang="en-US" dirty="0" smtClean="0"/>
+              <a:t>        while ($row = $ rows-&gt;</a:t>
+            </a:r>
+            <a:r>
+              <a:rPr lang="en-US" dirty="0" err="1" smtClean="0"/>
+              <a:t>fetch_assoc</a:t>
+            </a:r>
+            <a:r>
+              <a:rPr lang="en-US" dirty="0" smtClean="0"/>
+              <a:t>())</a:t>
+            </a:r>
+          </a:p>
+          <a:p>
+            <a:r>
+              <a:rPr lang="en-US" dirty="0"/>
+              <a:t> </a:t>
+            </a:r>
+            <a:r>
+              <a:rPr lang="en-US" dirty="0" smtClean="0"/>
+              <a:t>           {</a:t>
+            </a:r>
+          </a:p>
+          <a:p>
+            <a:r>
+              <a:rPr lang="en-US" dirty="0"/>
+              <a:t> </a:t>
+            </a:r>
+            <a:r>
+              <a:rPr lang="en-US" dirty="0" smtClean="0"/>
+              <a:t>               echo $row[‘Surname’];</a:t>
+            </a:r>
+          </a:p>
+          <a:p>
+            <a:r>
+              <a:rPr lang="en-US" dirty="0"/>
+              <a:t> </a:t>
+            </a:r>
+            <a:r>
+              <a:rPr lang="en-US" dirty="0" smtClean="0"/>
+              <a:t>           }</a:t>
+            </a:r>
+          </a:p>
+          <a:p>
+            <a:r>
+              <a:rPr lang="en-US" dirty="0"/>
+              <a:t> </a:t>
+            </a:r>
+            <a:r>
+              <a:rPr lang="en-US" dirty="0" smtClean="0"/>
+              <a:t>     }</a:t>
+            </a:r>
           </a:p>
         </p:txBody>
       </p:sp>
     </p:spTree>
     <p:extLst>
       <p:ext uri="{BB962C8B-B14F-4D97-AF65-F5344CB8AC3E}">
-        <p14:creationId xmlns:p14="http://schemas.microsoft.com/office/powerpoint/2010/main" val="1221347506"/>
+        <p14:creationId xmlns:p14="http://schemas.microsoft.com/office/powerpoint/2010/main" val="3487365792"/>
       </p:ext>
     </p:extLst>
   </p:cSld>
@@ -3660,67 +6389,128 @@
       </p:grpSpPr>
       <p:sp>
         <p:nvSpPr>
-          <p:cNvPr id="2" name="Title 1"/>
-          <p:cNvSpPr>
-            <a:spLocks noGrp="1"/>
-          </p:cNvSpPr>
-          <p:nvPr>
-            <p:ph type="title"/>
-          </p:nvPr>
-        </p:nvSpPr>
-        <p:spPr/>
-        <p:txBody>
-          <a:bodyPr/>
-          <a:lstStyle/>
-          <a:p>
-            <a:r>
-              <a:rPr lang="en-US" dirty="0" smtClean="0"/>
-              <a:t>Encapsulate low-level APIs</a:t>
-            </a:r>
-            <a:endParaRPr lang="en-US" dirty="0"/>
-          </a:p>
-        </p:txBody>
-      </p:sp>
-      <p:sp>
-        <p:nvSpPr>
-          <p:cNvPr id="3" name="Content Placeholder 2"/>
-          <p:cNvSpPr>
-            <a:spLocks noGrp="1"/>
-          </p:cNvSpPr>
-          <p:nvPr>
-            <p:ph idx="1"/>
-          </p:nvPr>
-        </p:nvSpPr>
-        <p:spPr/>
-        <p:txBody>
-          <a:bodyPr/>
-          <a:lstStyle/>
-          <a:p>
-            <a:r>
-              <a:rPr lang="en-US" dirty="0" smtClean="0"/>
-              <a:t>APIs are normally presented as low level building blocks</a:t>
-            </a:r>
-          </a:p>
-          <a:p>
-            <a:r>
-              <a:rPr lang="en-US" dirty="0" smtClean="0"/>
-              <a:t>Wrap them in parameterized functions</a:t>
-            </a:r>
-          </a:p>
-          <a:p>
-            <a:pPr lvl="1"/>
-            <a:r>
-              <a:rPr lang="en-US" dirty="0" smtClean="0"/>
-              <a:t>Even better, use classes</a:t>
-            </a:r>
-            <a:endParaRPr lang="en-US" dirty="0"/>
+          <p:cNvPr id="2" name="TextBox 1"/>
+          <p:cNvSpPr txBox="1"/>
+          <p:nvPr/>
+        </p:nvSpPr>
+        <p:spPr>
+          <a:xfrm>
+            <a:off x="596722" y="780383"/>
+            <a:ext cx="8226754" cy="1323439"/>
+          </a:xfrm>
+          <a:prstGeom prst="rect">
+            <a:avLst/>
+          </a:prstGeom>
+          <a:noFill/>
+        </p:spPr>
+        <p:txBody>
+          <a:bodyPr wrap="square" rtlCol="0">
+            <a:spAutoFit/>
+          </a:bodyPr>
+          <a:lstStyle/>
+          <a:p>
+            <a:r>
+              <a:rPr lang="en-US" sz="1600" dirty="0" smtClean="0"/>
+              <a:t>$</a:t>
+            </a:r>
+            <a:r>
+              <a:rPr lang="en-US" sz="1600" dirty="0" err="1" smtClean="0"/>
+              <a:t>mysqli</a:t>
+            </a:r>
+            <a:r>
+              <a:rPr lang="en-US" sz="1600" dirty="0" smtClean="0"/>
+              <a:t> = </a:t>
+            </a:r>
+            <a:r>
+              <a:rPr lang="en-US" sz="1600" dirty="0" err="1" smtClean="0"/>
+              <a:t>ConnectToDatabase</a:t>
+            </a:r>
+            <a:r>
+              <a:rPr lang="en-US" sz="1600" dirty="0" smtClean="0"/>
+              <a:t>(</a:t>
+            </a:r>
+            <a:r>
+              <a:rPr lang="en-US" sz="1600" dirty="0"/>
+              <a:t>“</a:t>
+            </a:r>
+            <a:r>
+              <a:rPr lang="en-US" sz="1600" dirty="0" err="1"/>
+              <a:t>MyHost</a:t>
+            </a:r>
+            <a:r>
+              <a:rPr lang="en-US" sz="1600" dirty="0"/>
+              <a:t>”, “</a:t>
+            </a:r>
+            <a:r>
+              <a:rPr lang="en-US" sz="1600" dirty="0" err="1"/>
+              <a:t>xyzzy</a:t>
+            </a:r>
+            <a:r>
+              <a:rPr lang="en-US" sz="1600" dirty="0"/>
+              <a:t>”, “</a:t>
+            </a:r>
+            <a:r>
+              <a:rPr lang="en-US" sz="1600" dirty="0" err="1"/>
+              <a:t>SomePassword</a:t>
+            </a:r>
+            <a:r>
+              <a:rPr lang="en-US" sz="1600" dirty="0"/>
+              <a:t>”, “</a:t>
+            </a:r>
+            <a:r>
+              <a:rPr lang="en-US" sz="1600" dirty="0" err="1" smtClean="0"/>
+              <a:t>NamesAndAddresses</a:t>
+            </a:r>
+            <a:r>
+              <a:rPr lang="en-US" sz="1600" dirty="0" smtClean="0"/>
+              <a:t>”);</a:t>
+            </a:r>
+          </a:p>
+          <a:p>
+            <a:endParaRPr lang="en-US" sz="1600" dirty="0" smtClean="0"/>
+          </a:p>
+          <a:p>
+            <a:r>
+              <a:rPr lang="en-US" sz="1600" dirty="0" smtClean="0"/>
+              <a:t>$rows = </a:t>
+            </a:r>
+            <a:r>
+              <a:rPr lang="en-US" sz="1600" dirty="0" err="1" smtClean="0"/>
+              <a:t>GeneralQuery</a:t>
+            </a:r>
+            <a:r>
+              <a:rPr lang="en-US" sz="1600" dirty="0" smtClean="0"/>
+              <a:t>(“</a:t>
+            </a:r>
+            <a:r>
+              <a:rPr lang="en-US" sz="1600" dirty="0"/>
+              <a:t>select * from Addresses order by </a:t>
+            </a:r>
+            <a:r>
+              <a:rPr lang="en-US" sz="1600" dirty="0" smtClean="0"/>
+              <a:t>Surname”);</a:t>
+            </a:r>
+          </a:p>
+          <a:p>
+            <a:endParaRPr lang="en-US" sz="1600" dirty="0" smtClean="0"/>
+          </a:p>
+          <a:p>
+            <a:r>
+              <a:rPr lang="en-US" sz="1600" dirty="0" err="1" smtClean="0"/>
+              <a:t>ProcessRows</a:t>
+            </a:r>
+            <a:r>
+              <a:rPr lang="en-US" sz="1600" dirty="0" smtClean="0"/>
+              <a:t>($rows);</a:t>
+            </a:r>
+            <a:endParaRPr lang="en-US" sz="1600" dirty="0"/>
           </a:p>
         </p:txBody>
       </p:sp>
     </p:spTree>
     <p:extLst>
       <p:ext uri="{BB962C8B-B14F-4D97-AF65-F5344CB8AC3E}">
-        <p14:creationId xmlns:p14="http://schemas.microsoft.com/office/powerpoint/2010/main" val="3930462537"/>
+        <p14:creationId xmlns:p14="http://schemas.microsoft.com/office/powerpoint/2010/main" val="3686197534"/>
       </p:ext>
     </p:extLst>
   </p:cSld>
@@ -3764,7 +6554,7 @@
           <a:p>
             <a:r>
               <a:rPr lang="en-US" dirty="0" smtClean="0"/>
-              <a:t>Version 1</a:t>
+              <a:t>Basic blocks</a:t>
             </a:r>
             <a:endParaRPr lang="en-US" dirty="0"/>
           </a:p>
@@ -3772,14 +6562,106 @@
       </p:sp>
       <p:sp>
         <p:nvSpPr>
-          <p:cNvPr id="4" name="TextBox 3"/>
+          <p:cNvPr id="3" name="Content Placeholder 2"/>
+          <p:cNvSpPr>
+            <a:spLocks noGrp="1"/>
+          </p:cNvSpPr>
+          <p:nvPr>
+            <p:ph idx="1"/>
+          </p:nvPr>
+        </p:nvSpPr>
+        <p:spPr/>
+        <p:txBody>
+          <a:bodyPr/>
+          <a:lstStyle/>
+          <a:p>
+            <a:r>
+              <a:rPr lang="en-US" dirty="0" smtClean="0"/>
+              <a:t>Single entry/single return</a:t>
+            </a:r>
+          </a:p>
+          <a:p>
+            <a:pPr lvl="1"/>
+            <a:r>
+              <a:rPr lang="en-US" dirty="0" smtClean="0"/>
+              <a:t>Start at the top, end at the bottom</a:t>
+            </a:r>
+          </a:p>
+          <a:p>
+            <a:pPr lvl="1"/>
+            <a:r>
+              <a:rPr lang="en-US" dirty="0" smtClean="0"/>
+              <a:t>Never return from the middle</a:t>
+            </a:r>
+          </a:p>
+          <a:p>
+            <a:endParaRPr lang="en-US" dirty="0"/>
+          </a:p>
+        </p:txBody>
+      </p:sp>
+    </p:spTree>
+    <p:extLst>
+      <p:ext uri="{BB962C8B-B14F-4D97-AF65-F5344CB8AC3E}">
+        <p14:creationId xmlns:p14="http://schemas.microsoft.com/office/powerpoint/2010/main" val="1049061332"/>
+      </p:ext>
+    </p:extLst>
+  </p:cSld>
+  <p:clrMapOvr>
+    <a:masterClrMapping/>
+  </p:clrMapOvr>
+</p:sld>
+</file>
+
+<file path=ppt/slides/slide9.xml><?xml version="1.0" encoding="utf-8"?>
+<p:sld xmlns:a="http://schemas.openxmlformats.org/drawingml/2006/main" xmlns:r="http://schemas.openxmlformats.org/officeDocument/2006/relationships" xmlns:p="http://schemas.openxmlformats.org/presentationml/2006/main">
+  <p:cSld>
+    <p:spTree>
+      <p:nvGrpSpPr>
+        <p:cNvPr id="1" name=""/>
+        <p:cNvGrpSpPr/>
+        <p:nvPr/>
+      </p:nvGrpSpPr>
+      <p:grpSpPr>
+        <a:xfrm>
+          <a:off x="0" y="0"/>
+          <a:ext cx="0" cy="0"/>
+          <a:chOff x="0" y="0"/>
+          <a:chExt cx="0" cy="0"/>
+        </a:xfrm>
+      </p:grpSpPr>
+      <p:sp>
+        <p:nvSpPr>
+          <p:cNvPr id="2" name="Title 1"/>
+          <p:cNvSpPr>
+            <a:spLocks noGrp="1"/>
+          </p:cNvSpPr>
+          <p:nvPr>
+            <p:ph type="title"/>
+          </p:nvPr>
+        </p:nvSpPr>
+        <p:spPr/>
+        <p:txBody>
+          <a:bodyPr/>
+          <a:lstStyle/>
+          <a:p>
+            <a:r>
+              <a:rPr lang="en-US" smtClean="0"/>
+              <a:t>Don’t not do positives!</a:t>
+            </a:r>
+            <a:endParaRPr lang="en-US"/>
+          </a:p>
+        </p:txBody>
+      </p:sp>
+      <p:sp>
+        <p:nvSpPr>
+          <p:cNvPr id="5" name="TextBox 4"/>
           <p:cNvSpPr txBox="1"/>
           <p:nvPr/>
         </p:nvSpPr>
         <p:spPr>
           <a:xfrm>
-            <a:off x="651003" y="1417638"/>
-            <a:ext cx="7931931" cy="1200329"/>
+            <a:off x="872720" y="1583021"/>
+            <a:ext cx="2724273" cy="1754327"/>
           </a:xfrm>
           <a:prstGeom prst="rect">
             <a:avLst/>
@@ -3787,200 +6669,54 @@
           <a:noFill/>
         </p:spPr>
         <p:txBody>
-          <a:bodyPr wrap="square" rtlCol="0">
+          <a:bodyPr wrap="none" rtlCol="0">
             <a:spAutoFit/>
           </a:bodyPr>
           <a:lstStyle/>
           <a:p>
             <a:r>
-              <a:rPr lang="en-US" dirty="0" smtClean="0"/>
-              <a:t>http://</a:t>
-            </a:r>
-            <a:r>
-              <a:rPr lang="en-US" dirty="0" err="1" smtClean="0"/>
-              <a:t>api.flickr.com</a:t>
-            </a:r>
-            <a:r>
-              <a:rPr lang="en-US" dirty="0" smtClean="0"/>
-              <a:t>/services/rest/?format=</a:t>
-            </a:r>
-            <a:r>
-              <a:rPr lang="en-US" dirty="0" err="1" smtClean="0"/>
-              <a:t>json&amp;method</a:t>
-            </a:r>
-            <a:r>
-              <a:rPr lang="en-US" dirty="0" smtClean="0"/>
-              <a:t>=</a:t>
-            </a:r>
-            <a:r>
-              <a:rPr lang="en-US" dirty="0" err="1" smtClean="0"/>
-              <a:t>flickr.photos.search&amp;user_id</a:t>
-            </a:r>
-            <a:r>
-              <a:rPr lang="en-US" dirty="0" smtClean="0"/>
-              <a:t>=24878717%40N06&amp;sort=</a:t>
-            </a:r>
-            <a:r>
-              <a:rPr lang="en-US" dirty="0" err="1" smtClean="0"/>
-              <a:t>date-taken-desc&amp;api_key</a:t>
-            </a:r>
-            <a:r>
-              <a:rPr lang="en-US" dirty="0" smtClean="0"/>
-              <a:t>=[API Key]</a:t>
-            </a:r>
-          </a:p>
-          <a:p>
-            <a:endParaRPr lang="en-US" dirty="0"/>
-          </a:p>
-        </p:txBody>
-      </p:sp>
-      <p:sp>
-        <p:nvSpPr>
-          <p:cNvPr id="5" name="TextBox 4"/>
-          <p:cNvSpPr txBox="1"/>
-          <p:nvPr/>
-        </p:nvSpPr>
-        <p:spPr>
-          <a:xfrm>
-            <a:off x="651003" y="3043742"/>
-            <a:ext cx="7701514" cy="2031325"/>
-          </a:xfrm>
-          <a:prstGeom prst="rect">
-            <a:avLst/>
-          </a:prstGeom>
-          <a:noFill/>
-        </p:spPr>
-        <p:txBody>
-          <a:bodyPr wrap="square" rtlCol="0">
-            <a:spAutoFit/>
-          </a:bodyPr>
-          <a:lstStyle/>
-          <a:p>
-            <a:r>
-              <a:rPr lang="en-US" dirty="0" smtClean="0"/>
-              <a:t>Function </a:t>
-            </a:r>
-            <a:r>
-              <a:rPr lang="en-US" dirty="0" err="1" smtClean="0"/>
-              <a:t>SearchPhoto</a:t>
-            </a:r>
-            <a:r>
-              <a:rPr lang="en-US" dirty="0" smtClean="0"/>
-              <a:t>($</a:t>
-            </a:r>
-            <a:r>
-              <a:rPr lang="en-US" dirty="0" err="1" smtClean="0"/>
-              <a:t>userid</a:t>
-            </a:r>
-            <a:r>
-              <a:rPr lang="en-US" dirty="0" smtClean="0"/>
-              <a:t>, $sort, $key)</a:t>
-            </a:r>
-          </a:p>
-          <a:p>
-            <a:r>
-              <a:rPr lang="en-US" dirty="0" smtClean="0"/>
+              <a:rPr lang="en-US" smtClean="0"/>
+              <a:t>function NoDataAvailable()</a:t>
+            </a:r>
+          </a:p>
+          <a:p>
+            <a:r>
+              <a:rPr lang="en-US" smtClean="0"/>
               <a:t>{</a:t>
             </a:r>
           </a:p>
           <a:p>
             <a:r>
-              <a:rPr lang="en-US" dirty="0"/>
+              <a:rPr lang="en-US"/>
               <a:t> </a:t>
             </a:r>
             <a:r>
-              <a:rPr lang="en-US" dirty="0" smtClean="0"/>
-              <a:t>  $query= “</a:t>
-            </a:r>
-            <a:r>
-              <a:rPr lang="en-US" dirty="0" smtClean="0"/>
-              <a:t>http://api.flickr.com/services/rest/?</a:t>
-            </a:r>
-          </a:p>
-          <a:p>
-            <a:r>
-              <a:rPr lang="en-US" dirty="0"/>
-              <a:t> </a:t>
-            </a:r>
-            <a:r>
-              <a:rPr lang="en-US" dirty="0" smtClean="0"/>
-              <a:t>                   </a:t>
-            </a:r>
-            <a:r>
-              <a:rPr lang="en-US" dirty="0" smtClean="0"/>
-              <a:t>format=</a:t>
-            </a:r>
-            <a:r>
-              <a:rPr lang="en-US" dirty="0" err="1" smtClean="0"/>
-              <a:t>json&amp;method</a:t>
-            </a:r>
-            <a:r>
-              <a:rPr lang="en-US" dirty="0" smtClean="0"/>
-              <a:t>=</a:t>
-            </a:r>
-            <a:r>
-              <a:rPr lang="en-US" dirty="0" err="1" smtClean="0"/>
-              <a:t>flickr.photos.search&amp;user_id</a:t>
-            </a:r>
-            <a:r>
-              <a:rPr lang="en-US" dirty="0" smtClean="0"/>
-              <a:t>=$</a:t>
-            </a:r>
-            <a:r>
-              <a:rPr lang="en-US" dirty="0" err="1" smtClean="0"/>
-              <a:t>userid&amp;sort</a:t>
-            </a:r>
-            <a:r>
-              <a:rPr lang="en-US" dirty="0" smtClean="0"/>
-              <a:t>=</a:t>
-            </a:r>
-          </a:p>
-          <a:p>
-            <a:r>
-              <a:rPr lang="en-US" dirty="0"/>
-              <a:t> </a:t>
-            </a:r>
-            <a:r>
-              <a:rPr lang="en-US" dirty="0" smtClean="0"/>
-              <a:t>                   </a:t>
-            </a:r>
-            <a:r>
-              <a:rPr lang="en-US" dirty="0" smtClean="0"/>
-              <a:t>$</a:t>
-            </a:r>
-            <a:r>
-              <a:rPr lang="en-US" dirty="0" err="1" smtClean="0"/>
-              <a:t>sort&amp;api_key</a:t>
-            </a:r>
-            <a:r>
-              <a:rPr lang="en-US" dirty="0" smtClean="0"/>
-              <a:t>=$key”;</a:t>
-            </a:r>
-          </a:p>
-          <a:p>
-            <a:r>
-              <a:rPr lang="en-US" dirty="0"/>
-              <a:t> </a:t>
-            </a:r>
-            <a:r>
-              <a:rPr lang="en-US" dirty="0" smtClean="0"/>
-              <a:t>  return $query;</a:t>
-            </a:r>
-            <a:endParaRPr lang="en-US" dirty="0" smtClean="0"/>
-          </a:p>
-          <a:p>
-            <a:r>
-              <a:rPr lang="en-US" dirty="0" smtClean="0"/>
+              <a:rPr lang="en-US" smtClean="0"/>
+              <a:t>  …</a:t>
+            </a:r>
+          </a:p>
+          <a:p>
+            <a:r>
+              <a:rPr lang="en-US" smtClean="0"/>
               <a:t>}</a:t>
             </a:r>
-            <a:endParaRPr lang="en-US" dirty="0"/>
+          </a:p>
+          <a:p>
+            <a:endParaRPr lang="en-US"/>
+          </a:p>
+          <a:p>
+            <a:r>
+              <a:rPr lang="en-US" smtClean="0"/>
+              <a:t>if (! NoDataAvailable()) ….</a:t>
+            </a:r>
+            <a:endParaRPr lang="en-US"/>
           </a:p>
         </p:txBody>
       </p:sp>
     </p:spTree>
     <p:extLst>
       <p:ext uri="{BB962C8B-B14F-4D97-AF65-F5344CB8AC3E}">
-        <p14:creationId xmlns:p14="http://schemas.microsoft.com/office/powerpoint/2010/main" val="482382423"/>
+        <p14:creationId xmlns:p14="http://schemas.microsoft.com/office/powerpoint/2010/main" val="3270330207"/>
       </p:ext>
     </p:extLst>
   </p:cSld>
@@ -4308,4 +7044,324 @@
   </a:objectDefaults>
   <a:extraClrSchemeLst/>
 </a:theme>
+</file>
+
+<file path=ppt/theme/theme2.xml><?xml version="1.0" encoding="utf-8"?>
+<a:theme xmlns:a="http://schemas.openxmlformats.org/drawingml/2006/main" name="Office Theme">
+  <a:themeElements>
+    <a:clrScheme name="Office">
+      <a:dk1>
+        <a:sysClr val="windowText" lastClr="000000"/>
+      </a:dk1>
+      <a:lt1>
+        <a:sysClr val="window" lastClr="FFFFFF"/>
+      </a:lt1>
+      <a:dk2>
+        <a:srgbClr val="1F497D"/>
+      </a:dk2>
+      <a:lt2>
+        <a:srgbClr val="EEECE1"/>
+      </a:lt2>
+      <a:accent1>
+        <a:srgbClr val="4F81BD"/>
+      </a:accent1>
+      <a:accent2>
+        <a:srgbClr val="C0504D"/>
+      </a:accent2>
+      <a:accent3>
+        <a:srgbClr val="9BBB59"/>
+      </a:accent3>
+      <a:accent4>
+        <a:srgbClr val="8064A2"/>
+      </a:accent4>
+      <a:accent5>
+        <a:srgbClr val="4BACC6"/>
+      </a:accent5>
+      <a:accent6>
+        <a:srgbClr val="F79646"/>
+      </a:accent6>
+      <a:hlink>
+        <a:srgbClr val="0000FF"/>
+      </a:hlink>
+      <a:folHlink>
+        <a:srgbClr val="800080"/>
+      </a:folHlink>
+    </a:clrScheme>
+    <a:fontScheme name="Office">
+      <a:majorFont>
+        <a:latin typeface="Calibri"/>
+        <a:ea typeface=""/>
+        <a:cs typeface=""/>
+        <a:font script="Jpan" typeface="ＭＳ Ｐゴシック"/>
+        <a:font script="Hang" typeface="맑은 고딕"/>
+        <a:font script="Hans" typeface="宋体"/>
+        <a:font script="Hant" typeface="新細明體"/>
+        <a:font script="Arab" typeface="Times New Roman"/>
+        <a:font script="Hebr" typeface="Times New Roman"/>
+        <a:font script="Thai" typeface="Angsana New"/>
+        <a:font script="Ethi" typeface="Nyala"/>
+        <a:font script="Beng" typeface="Vrinda"/>
+        <a:font script="Gujr" typeface="Shruti"/>
+        <a:font script="Khmr" typeface="MoolBoran"/>
+        <a:font script="Knda" typeface="Tunga"/>
+        <a:font script="Guru" typeface="Raavi"/>
+        <a:font script="Cans" typeface="Euphemia"/>
+        <a:font script="Cher" typeface="Plantagenet Cherokee"/>
+        <a:font script="Yiii" typeface="Microsoft Yi Baiti"/>
+        <a:font script="Tibt" typeface="Microsoft Himalaya"/>
+        <a:font script="Thaa" typeface="MV Boli"/>
+        <a:font script="Deva" typeface="Mangal"/>
+        <a:font script="Telu" typeface="Gautami"/>
+        <a:font script="Taml" typeface="Latha"/>
+        <a:font script="Syrc" typeface="Estrangelo Edessa"/>
+        <a:font script="Orya" typeface="Kalinga"/>
+        <a:font script="Mlym" typeface="Kartika"/>
+        <a:font script="Laoo" typeface="DokChampa"/>
+        <a:font script="Sinh" typeface="Iskoola Pota"/>
+        <a:font script="Mong" typeface="Mongolian Baiti"/>
+        <a:font script="Viet" typeface="Times New Roman"/>
+        <a:font script="Uigh" typeface="Microsoft Uighur"/>
+        <a:font script="Geor" typeface="Sylfaen"/>
+      </a:majorFont>
+      <a:minorFont>
+        <a:latin typeface="Calibri"/>
+        <a:ea typeface=""/>
+        <a:cs typeface=""/>
+        <a:font script="Jpan" typeface="ＭＳ Ｐゴシック"/>
+        <a:font script="Hang" typeface="맑은 고딕"/>
+        <a:font script="Hans" typeface="宋体"/>
+        <a:font script="Hant" typeface="新細明體"/>
+        <a:font script="Arab" typeface="Arial"/>
+        <a:font script="Hebr" typeface="Arial"/>
+        <a:font script="Thai" typeface="Cordia New"/>
+        <a:font script="Ethi" typeface="Nyala"/>
+        <a:font script="Beng" typeface="Vrinda"/>
+        <a:font script="Gujr" typeface="Shruti"/>
+        <a:font script="Khmr" typeface="DaunPenh"/>
+        <a:font script="Knda" typeface="Tunga"/>
+        <a:font script="Guru" typeface="Raavi"/>
+        <a:font script="Cans" typeface="Euphemia"/>
+        <a:font script="Cher" typeface="Plantagenet Cherokee"/>
+        <a:font script="Yiii" typeface="Microsoft Yi Baiti"/>
+        <a:font script="Tibt" typeface="Microsoft Himalaya"/>
+        <a:font script="Thaa" typeface="MV Boli"/>
+        <a:font script="Deva" typeface="Mangal"/>
+        <a:font script="Telu" typeface="Gautami"/>
+        <a:font script="Taml" typeface="Latha"/>
+        <a:font script="Syrc" typeface="Estrangelo Edessa"/>
+        <a:font script="Orya" typeface="Kalinga"/>
+        <a:font script="Mlym" typeface="Kartika"/>
+        <a:font script="Laoo" typeface="DokChampa"/>
+        <a:font script="Sinh" typeface="Iskoola Pota"/>
+        <a:font script="Mong" typeface="Mongolian Baiti"/>
+        <a:font script="Viet" typeface="Arial"/>
+        <a:font script="Uigh" typeface="Microsoft Uighur"/>
+        <a:font script="Geor" typeface="Sylfaen"/>
+      </a:minorFont>
+    </a:fontScheme>
+    <a:fmtScheme name="Office">
+      <a:fillStyleLst>
+        <a:solidFill>
+          <a:schemeClr val="phClr"/>
+        </a:solidFill>
+        <a:gradFill rotWithShape="1">
+          <a:gsLst>
+            <a:gs pos="0">
+              <a:schemeClr val="phClr">
+                <a:tint val="50000"/>
+                <a:satMod val="300000"/>
+              </a:schemeClr>
+            </a:gs>
+            <a:gs pos="35000">
+              <a:schemeClr val="phClr">
+                <a:tint val="37000"/>
+                <a:satMod val="300000"/>
+              </a:schemeClr>
+            </a:gs>
+            <a:gs pos="100000">
+              <a:schemeClr val="phClr">
+                <a:tint val="15000"/>
+                <a:satMod val="350000"/>
+              </a:schemeClr>
+            </a:gs>
+          </a:gsLst>
+          <a:lin ang="16200000" scaled="1"/>
+        </a:gradFill>
+        <a:gradFill rotWithShape="1">
+          <a:gsLst>
+            <a:gs pos="0">
+              <a:schemeClr val="phClr">
+                <a:tint val="100000"/>
+                <a:shade val="100000"/>
+                <a:satMod val="130000"/>
+              </a:schemeClr>
+            </a:gs>
+            <a:gs pos="100000">
+              <a:schemeClr val="phClr">
+                <a:tint val="50000"/>
+                <a:shade val="100000"/>
+                <a:satMod val="350000"/>
+              </a:schemeClr>
+            </a:gs>
+          </a:gsLst>
+          <a:lin ang="16200000" scaled="0"/>
+        </a:gradFill>
+      </a:fillStyleLst>
+      <a:lnStyleLst>
+        <a:ln w="9525" cap="flat" cmpd="sng" algn="ctr">
+          <a:solidFill>
+            <a:schemeClr val="phClr">
+              <a:shade val="95000"/>
+              <a:satMod val="105000"/>
+            </a:schemeClr>
+          </a:solidFill>
+          <a:prstDash val="solid"/>
+        </a:ln>
+        <a:ln w="25400" cap="flat" cmpd="sng" algn="ctr">
+          <a:solidFill>
+            <a:schemeClr val="phClr"/>
+          </a:solidFill>
+          <a:prstDash val="solid"/>
+        </a:ln>
+        <a:ln w="38100" cap="flat" cmpd="sng" algn="ctr">
+          <a:solidFill>
+            <a:schemeClr val="phClr"/>
+          </a:solidFill>
+          <a:prstDash val="solid"/>
+        </a:ln>
+      </a:lnStyleLst>
+      <a:effectStyleLst>
+        <a:effectStyle>
+          <a:effectLst>
+            <a:outerShdw blurRad="40000" dist="20000" dir="5400000" rotWithShape="0">
+              <a:srgbClr val="000000">
+                <a:alpha val="38000"/>
+              </a:srgbClr>
+            </a:outerShdw>
+          </a:effectLst>
+        </a:effectStyle>
+        <a:effectStyle>
+          <a:effectLst>
+            <a:outerShdw blurRad="40000" dist="23000" dir="5400000" rotWithShape="0">
+              <a:srgbClr val="000000">
+                <a:alpha val="35000"/>
+              </a:srgbClr>
+            </a:outerShdw>
+          </a:effectLst>
+        </a:effectStyle>
+        <a:effectStyle>
+          <a:effectLst>
+            <a:outerShdw blurRad="40000" dist="23000" dir="5400000" rotWithShape="0">
+              <a:srgbClr val="000000">
+                <a:alpha val="35000"/>
+              </a:srgbClr>
+            </a:outerShdw>
+          </a:effectLst>
+          <a:scene3d>
+            <a:camera prst="orthographicFront">
+              <a:rot lat="0" lon="0" rev="0"/>
+            </a:camera>
+            <a:lightRig rig="threePt" dir="t">
+              <a:rot lat="0" lon="0" rev="1200000"/>
+            </a:lightRig>
+          </a:scene3d>
+          <a:sp3d>
+            <a:bevelT w="63500" h="25400"/>
+          </a:sp3d>
+        </a:effectStyle>
+      </a:effectStyleLst>
+      <a:bgFillStyleLst>
+        <a:solidFill>
+          <a:schemeClr val="phClr"/>
+        </a:solidFill>
+        <a:gradFill rotWithShape="1">
+          <a:gsLst>
+            <a:gs pos="0">
+              <a:schemeClr val="phClr">
+                <a:tint val="40000"/>
+                <a:satMod val="350000"/>
+              </a:schemeClr>
+            </a:gs>
+            <a:gs pos="40000">
+              <a:schemeClr val="phClr">
+                <a:tint val="45000"/>
+                <a:shade val="99000"/>
+                <a:satMod val="350000"/>
+              </a:schemeClr>
+            </a:gs>
+            <a:gs pos="100000">
+              <a:schemeClr val="phClr">
+                <a:shade val="20000"/>
+                <a:satMod val="255000"/>
+              </a:schemeClr>
+            </a:gs>
+          </a:gsLst>
+          <a:path path="circle">
+            <a:fillToRect l="50000" t="-80000" r="50000" b="180000"/>
+          </a:path>
+        </a:gradFill>
+        <a:gradFill rotWithShape="1">
+          <a:gsLst>
+            <a:gs pos="0">
+              <a:schemeClr val="phClr">
+                <a:tint val="80000"/>
+                <a:satMod val="300000"/>
+              </a:schemeClr>
+            </a:gs>
+            <a:gs pos="100000">
+              <a:schemeClr val="phClr">
+                <a:shade val="30000"/>
+                <a:satMod val="200000"/>
+              </a:schemeClr>
+            </a:gs>
+          </a:gsLst>
+          <a:path path="circle">
+            <a:fillToRect l="50000" t="50000" r="50000" b="50000"/>
+          </a:path>
+        </a:gradFill>
+      </a:bgFillStyleLst>
+    </a:fmtScheme>
+  </a:themeElements>
+  <a:objectDefaults>
+    <a:spDef>
+      <a:spPr/>
+      <a:bodyPr/>
+      <a:lstStyle/>
+      <a:style>
+        <a:lnRef idx="1">
+          <a:schemeClr val="accent1"/>
+        </a:lnRef>
+        <a:fillRef idx="3">
+          <a:schemeClr val="accent1"/>
+        </a:fillRef>
+        <a:effectRef idx="2">
+          <a:schemeClr val="accent1"/>
+        </a:effectRef>
+        <a:fontRef idx="minor">
+          <a:schemeClr val="lt1"/>
+        </a:fontRef>
+      </a:style>
+    </a:spDef>
+    <a:lnDef>
+      <a:spPr/>
+      <a:bodyPr/>
+      <a:lstStyle/>
+      <a:style>
+        <a:lnRef idx="2">
+          <a:schemeClr val="accent1"/>
+        </a:lnRef>
+        <a:fillRef idx="0">
+          <a:schemeClr val="accent1"/>
+        </a:fillRef>
+        <a:effectRef idx="1">
+          <a:schemeClr val="accent1"/>
+        </a:effectRef>
+        <a:fontRef idx="minor">
+          <a:schemeClr val="tx1"/>
+        </a:fontRef>
+      </a:style>
+    </a:lnDef>
+  </a:objectDefaults>
+  <a:extraClrSchemeLst/>
+</a:theme>
 </file>
</xml_diff>